<commit_message>
More changes and deleting more junk
</commit_message>
<xml_diff>
--- a/AirBnB Toronto Data Analysis.pptx
+++ b/AirBnB Toronto Data Analysis.pptx
@@ -5,7 +5,7 @@
     <p:sldMasterId id="2147483648" r:id="rId1"/>
   </p:sldMasterIdLst>
   <p:notesMasterIdLst>
-    <p:notesMasterId r:id="rId12"/>
+    <p:notesMasterId r:id="rId15"/>
   </p:notesMasterIdLst>
   <p:sldIdLst>
     <p:sldId id="256" r:id="rId2"/>
@@ -18,6 +18,9 @@
     <p:sldId id="596" r:id="rId9"/>
     <p:sldId id="597" r:id="rId10"/>
     <p:sldId id="598" r:id="rId11"/>
+    <p:sldId id="603" r:id="rId12"/>
+    <p:sldId id="600" r:id="rId13"/>
+    <p:sldId id="602" r:id="rId14"/>
   </p:sldIdLst>
   <p:sldSz cx="12192000" cy="6858000"/>
   <p:notesSz cx="6858000" cy="9144000"/>
@@ -5801,12 +5804,8 @@
           <a:lstStyle/>
           <a:p>
             <a:r>
-              <a:rPr lang="en-US" sz="2800" cap="none" dirty="0" err="1"/>
-              <a:t>AirBnB</a:t>
-            </a:r>
-            <a:r>
               <a:rPr lang="en-US" sz="2800" cap="none" dirty="0"/>
-              <a:t> Toronto Data Analysis</a:t>
+              <a:t>Airbnb Toronto Data Analysis</a:t>
             </a:r>
             <a:endParaRPr lang="en-CA" sz="2800" cap="none" dirty="0">
               <a:latin typeface="Arial" panose="020B0604020202020204" pitchFamily="34" charset="0"/>
@@ -5987,12 +5986,8 @@
           <a:lstStyle/>
           <a:p>
             <a:r>
-              <a:rPr lang="en-US" dirty="0" err="1"/>
-              <a:t>AirBnB</a:t>
-            </a:r>
-            <a:r>
               <a:rPr lang="en-US" dirty="0"/>
-              <a:t> Toronto Data Analysis</a:t>
+              <a:t>Airbnb Toronto Data Analysis</a:t>
             </a:r>
           </a:p>
         </p:txBody>
@@ -6251,20 +6246,12 @@
           <a:p>
             <a:pPr lvl="0" defTabSz="914400"/>
             <a:r>
-              <a:rPr lang="en-US" sz="2400" b="1" dirty="0" err="1">
+              <a:rPr lang="en-US" sz="2400" b="1" dirty="0">
                 <a:solidFill>
                   <a:sysClr val="window" lastClr="FFFFFF"/>
                 </a:solidFill>
               </a:rPr>
-              <a:t>AirBnB</a:t>
-            </a:r>
-            <a:r>
-              <a:rPr lang="en-US" sz="2400" b="1" dirty="0">
-                <a:solidFill>
-                  <a:sysClr val="window" lastClr="FFFFFF"/>
-                </a:solidFill>
-              </a:rPr>
-              <a:t> Toronto Data Analysis</a:t>
+              <a:t>Airbnb Toronto Data Analysis</a:t>
             </a:r>
             <a:br>
               <a:rPr kumimoji="0" lang="en-US" sz="2400" b="0" i="0" u="none" strike="noStrike" kern="1200" cap="none" spc="0" normalizeH="0" baseline="0" noProof="0" dirty="0">
@@ -6320,7 +6307,7 @@
 </p:sld>
 </file>
 
-<file path=ppt/slides/slide2.xml><?xml version="1.0" encoding="utf-8"?>
+<file path=ppt/slides/slide11.xml><?xml version="1.0" encoding="utf-8"?>
 <p:sld xmlns:a="http://schemas.openxmlformats.org/drawingml/2006/main" xmlns:r="http://schemas.openxmlformats.org/officeDocument/2006/relationships" xmlns:p="http://schemas.openxmlformats.org/presentationml/2006/main">
   <p:cSld>
     <p:spTree>
@@ -6337,273 +6324,6 @@
           <a:chExt cx="0" cy="0"/>
         </a:xfrm>
       </p:grpSpPr>
-      <p:sp>
-        <p:nvSpPr>
-          <p:cNvPr id="5" name="Title 1">
-            <a:extLst>
-              <a:ext uri="{FF2B5EF4-FFF2-40B4-BE49-F238E27FC236}">
-                <a16:creationId xmlns:a16="http://schemas.microsoft.com/office/drawing/2014/main" id="{02FB3FF4-C4B1-4F6B-BD55-EC26D607F64C}"/>
-              </a:ext>
-            </a:extLst>
-          </p:cNvPr>
-          <p:cNvSpPr txBox="1">
-            <a:spLocks/>
-          </p:cNvSpPr>
-          <p:nvPr/>
-        </p:nvSpPr>
-        <p:spPr bwMode="auto">
-          <a:xfrm>
-            <a:off x="1727200" y="274320"/>
-            <a:ext cx="10058400" cy="487363"/>
-          </a:xfrm>
-          <a:prstGeom prst="rect">
-            <a:avLst/>
-          </a:prstGeom>
-          <a:noFill/>
-          <a:ln>
-            <a:noFill/>
-          </a:ln>
-          <a:extLst>
-            <a:ext uri="{909E8E84-426E-40DD-AFC4-6F175D3DCCD1}">
-              <a14:hiddenFill xmlns:a14="http://schemas.microsoft.com/office/drawing/2010/main">
-                <a:solidFill>
-                  <a:srgbClr val="FFFFFF"/>
-                </a:solidFill>
-              </a14:hiddenFill>
-            </a:ext>
-            <a:ext uri="{91240B29-F687-4F45-9708-019B960494DF}">
-              <a14:hiddenLine xmlns:a14="http://schemas.microsoft.com/office/drawing/2010/main" w="9525">
-                <a:solidFill>
-                  <a:srgbClr val="000000"/>
-                </a:solidFill>
-                <a:miter lim="800000"/>
-                <a:headEnd/>
-                <a:tailEnd/>
-              </a14:hiddenLine>
-            </a:ext>
-          </a:extLst>
-        </p:spPr>
-        <p:txBody>
-          <a:bodyPr vert="horz" wrap="square" lIns="121899" tIns="60949" rIns="121899" bIns="60949" numCol="1" anchor="ctr" anchorCtr="0" compatLnSpc="1">
-            <a:prstTxWarp prst="textNoShape">
-              <a:avLst/>
-            </a:prstTxWarp>
-            <a:noAutofit/>
-          </a:bodyPr>
-          <a:lstStyle>
-            <a:lvl1pPr algn="l" rtl="0" eaLnBrk="1" fontAlgn="base" hangingPunct="1">
-              <a:spcBef>
-                <a:spcPct val="0"/>
-              </a:spcBef>
-              <a:spcAft>
-                <a:spcPct val="0"/>
-              </a:spcAft>
-              <a:defRPr sz="2200" kern="1200">
-                <a:solidFill>
-                  <a:schemeClr val="bg1"/>
-                </a:solidFill>
-                <a:latin typeface="Arial" pitchFamily="34" charset="0"/>
-                <a:ea typeface="+mj-ea"/>
-                <a:cs typeface="Arial" pitchFamily="34" charset="0"/>
-              </a:defRPr>
-            </a:lvl1pPr>
-            <a:lvl2pPr algn="l" rtl="0" eaLnBrk="1" fontAlgn="base" hangingPunct="1">
-              <a:spcBef>
-                <a:spcPct val="0"/>
-              </a:spcBef>
-              <a:spcAft>
-                <a:spcPct val="0"/>
-              </a:spcAft>
-              <a:defRPr sz="2900">
-                <a:solidFill>
-                  <a:schemeClr val="bg1"/>
-                </a:solidFill>
-                <a:latin typeface="Arial" pitchFamily="34" charset="0"/>
-                <a:cs typeface="Arial" pitchFamily="34" charset="0"/>
-              </a:defRPr>
-            </a:lvl2pPr>
-            <a:lvl3pPr algn="l" rtl="0" eaLnBrk="1" fontAlgn="base" hangingPunct="1">
-              <a:spcBef>
-                <a:spcPct val="0"/>
-              </a:spcBef>
-              <a:spcAft>
-                <a:spcPct val="0"/>
-              </a:spcAft>
-              <a:defRPr sz="2900">
-                <a:solidFill>
-                  <a:schemeClr val="bg1"/>
-                </a:solidFill>
-                <a:latin typeface="Arial" pitchFamily="34" charset="0"/>
-                <a:cs typeface="Arial" pitchFamily="34" charset="0"/>
-              </a:defRPr>
-            </a:lvl3pPr>
-            <a:lvl4pPr algn="l" rtl="0" eaLnBrk="1" fontAlgn="base" hangingPunct="1">
-              <a:spcBef>
-                <a:spcPct val="0"/>
-              </a:spcBef>
-              <a:spcAft>
-                <a:spcPct val="0"/>
-              </a:spcAft>
-              <a:defRPr sz="2900">
-                <a:solidFill>
-                  <a:schemeClr val="bg1"/>
-                </a:solidFill>
-                <a:latin typeface="Arial" pitchFamily="34" charset="0"/>
-                <a:cs typeface="Arial" pitchFamily="34" charset="0"/>
-              </a:defRPr>
-            </a:lvl4pPr>
-            <a:lvl5pPr algn="l" rtl="0" eaLnBrk="1" fontAlgn="base" hangingPunct="1">
-              <a:spcBef>
-                <a:spcPct val="0"/>
-              </a:spcBef>
-              <a:spcAft>
-                <a:spcPct val="0"/>
-              </a:spcAft>
-              <a:defRPr sz="2900">
-                <a:solidFill>
-                  <a:schemeClr val="bg1"/>
-                </a:solidFill>
-                <a:latin typeface="Arial" pitchFamily="34" charset="0"/>
-                <a:cs typeface="Arial" pitchFamily="34" charset="0"/>
-              </a:defRPr>
-            </a:lvl5pPr>
-            <a:lvl6pPr marL="609493" algn="l" rtl="0" eaLnBrk="1" fontAlgn="base" hangingPunct="1">
-              <a:spcBef>
-                <a:spcPct val="0"/>
-              </a:spcBef>
-              <a:spcAft>
-                <a:spcPct val="0"/>
-              </a:spcAft>
-              <a:defRPr sz="3700">
-                <a:solidFill>
-                  <a:schemeClr val="bg1"/>
-                </a:solidFill>
-                <a:latin typeface="Arial" pitchFamily="34" charset="0"/>
-                <a:cs typeface="Arial" pitchFamily="34" charset="0"/>
-              </a:defRPr>
-            </a:lvl6pPr>
-            <a:lvl7pPr marL="1218987" algn="l" rtl="0" eaLnBrk="1" fontAlgn="base" hangingPunct="1">
-              <a:spcBef>
-                <a:spcPct val="0"/>
-              </a:spcBef>
-              <a:spcAft>
-                <a:spcPct val="0"/>
-              </a:spcAft>
-              <a:defRPr sz="3700">
-                <a:solidFill>
-                  <a:schemeClr val="bg1"/>
-                </a:solidFill>
-                <a:latin typeface="Arial" pitchFamily="34" charset="0"/>
-                <a:cs typeface="Arial" pitchFamily="34" charset="0"/>
-              </a:defRPr>
-            </a:lvl7pPr>
-            <a:lvl8pPr marL="1828480" algn="l" rtl="0" eaLnBrk="1" fontAlgn="base" hangingPunct="1">
-              <a:spcBef>
-                <a:spcPct val="0"/>
-              </a:spcBef>
-              <a:spcAft>
-                <a:spcPct val="0"/>
-              </a:spcAft>
-              <a:defRPr sz="3700">
-                <a:solidFill>
-                  <a:schemeClr val="bg1"/>
-                </a:solidFill>
-                <a:latin typeface="Arial" pitchFamily="34" charset="0"/>
-                <a:cs typeface="Arial" pitchFamily="34" charset="0"/>
-              </a:defRPr>
-            </a:lvl8pPr>
-            <a:lvl9pPr marL="2437973" algn="l" rtl="0" eaLnBrk="1" fontAlgn="base" hangingPunct="1">
-              <a:spcBef>
-                <a:spcPct val="0"/>
-              </a:spcBef>
-              <a:spcAft>
-                <a:spcPct val="0"/>
-              </a:spcAft>
-              <a:defRPr sz="3700">
-                <a:solidFill>
-                  <a:schemeClr val="bg1"/>
-                </a:solidFill>
-                <a:latin typeface="Arial" pitchFamily="34" charset="0"/>
-                <a:cs typeface="Arial" pitchFamily="34" charset="0"/>
-              </a:defRPr>
-            </a:lvl9pPr>
-          </a:lstStyle>
-          <a:p>
-            <a:pPr lvl="0" defTabSz="914400"/>
-            <a:r>
-              <a:rPr lang="en-US" sz="2400" b="1" dirty="0" err="1">
-                <a:solidFill>
-                  <a:sysClr val="window" lastClr="FFFFFF"/>
-                </a:solidFill>
-              </a:rPr>
-              <a:t>AirBnB</a:t>
-            </a:r>
-            <a:r>
-              <a:rPr lang="en-US" sz="2400" b="1" dirty="0">
-                <a:solidFill>
-                  <a:sysClr val="window" lastClr="FFFFFF"/>
-                </a:solidFill>
-              </a:rPr>
-              <a:t> Toronto Data Analysis</a:t>
-            </a:r>
-            <a:br>
-              <a:rPr kumimoji="0" lang="en-US" sz="2400" b="0" i="0" u="none" strike="noStrike" kern="1200" cap="none" spc="0" normalizeH="0" baseline="0" noProof="0" dirty="0">
-                <a:ln>
-                  <a:noFill/>
-                </a:ln>
-                <a:solidFill>
-                  <a:sysClr val="window" lastClr="FFFFFF"/>
-                </a:solidFill>
-                <a:effectLst/>
-                <a:uLnTx/>
-                <a:uFillTx/>
-                <a:latin typeface="Arial" pitchFamily="34" charset="0"/>
-                <a:ea typeface="+mj-ea"/>
-                <a:cs typeface="Arial" pitchFamily="34" charset="0"/>
-              </a:rPr>
-            </a:br>
-            <a:r>
-              <a:rPr lang="en-GB" sz="2400" dirty="0">
-                <a:solidFill>
-                  <a:srgbClr val="FFDD3E"/>
-                </a:solidFill>
-              </a:rPr>
-              <a:t>Correlation Matrix – All</a:t>
-            </a:r>
-            <a:r>
-              <a:rPr kumimoji="0" lang="en-GB" sz="2400" b="0" i="0" u="none" strike="noStrike" kern="1200" cap="none" spc="0" normalizeH="0" baseline="0" noProof="0" dirty="0">
-                <a:ln>
-                  <a:noFill/>
-                </a:ln>
-                <a:solidFill>
-                  <a:srgbClr val="FFDD3E"/>
-                </a:solidFill>
-                <a:effectLst/>
-                <a:uLnTx/>
-                <a:uFillTx/>
-                <a:latin typeface="Arial" pitchFamily="34" charset="0"/>
-                <a:ea typeface="+mj-ea"/>
-                <a:cs typeface="Arial" pitchFamily="34" charset="0"/>
-              </a:rPr>
-              <a:t> Attributes</a:t>
-            </a:r>
-            <a:endParaRPr kumimoji="0" lang="en-GB" sz="2200" b="0" i="0" u="none" strike="noStrike" kern="1200" cap="none" spc="0" normalizeH="0" baseline="0" noProof="0" dirty="0">
-              <a:ln>
-                <a:noFill/>
-              </a:ln>
-              <a:solidFill>
-                <a:srgbClr val="FFDD3E"/>
-              </a:solidFill>
-              <a:effectLst/>
-              <a:uLnTx/>
-              <a:uFillTx/>
-              <a:latin typeface="Arial" pitchFamily="34" charset="0"/>
-              <a:ea typeface="+mj-ea"/>
-              <a:cs typeface="Arial" pitchFamily="34" charset="0"/>
-            </a:endParaRPr>
-          </a:p>
-        </p:txBody>
-      </p:sp>
       <p:sp>
         <p:nvSpPr>
           <p:cNvPr id="6" name="Rectangle 5">
@@ -6699,12 +6419,1904 @@
           <a:lstStyle/>
           <a:p>
             <a:r>
-              <a:rPr lang="en-US" dirty="0" err="1"/>
-              <a:t>AirBnB</a:t>
-            </a:r>
-            <a:r>
               <a:rPr lang="en-US" dirty="0"/>
-              <a:t> Toronto Data Analysis</a:t>
+              <a:t>Airbnb Toronto Data Analysis</a:t>
+            </a:r>
+          </a:p>
+        </p:txBody>
+      </p:sp>
+      <p:sp>
+        <p:nvSpPr>
+          <p:cNvPr id="15" name="Slide Number Placeholder 14">
+            <a:extLst>
+              <a:ext uri="{FF2B5EF4-FFF2-40B4-BE49-F238E27FC236}">
+                <a16:creationId xmlns:a16="http://schemas.microsoft.com/office/drawing/2014/main" id="{7DAE8B8A-1BBE-4F06-8589-01CD9CAE9D86}"/>
+              </a:ext>
+            </a:extLst>
+          </p:cNvPr>
+          <p:cNvSpPr>
+            <a:spLocks noGrp="1"/>
+          </p:cNvSpPr>
+          <p:nvPr>
+            <p:ph type="sldNum" sz="quarter" idx="12"/>
+          </p:nvPr>
+        </p:nvSpPr>
+        <p:spPr/>
+        <p:txBody>
+          <a:bodyPr/>
+          <a:lstStyle/>
+          <a:p>
+            <a:fld id="{D57F1E4F-1CFF-5643-939E-217C01CDF565}" type="slidenum">
+              <a:rPr lang="en-US" smtClean="0"/>
+              <a:pPr/>
+              <a:t>11</a:t>
+            </a:fld>
+            <a:endParaRPr lang="en-US" dirty="0"/>
+          </a:p>
+        </p:txBody>
+      </p:sp>
+      <p:sp>
+        <p:nvSpPr>
+          <p:cNvPr id="9" name="Title 1">
+            <a:extLst>
+              <a:ext uri="{FF2B5EF4-FFF2-40B4-BE49-F238E27FC236}">
+                <a16:creationId xmlns:a16="http://schemas.microsoft.com/office/drawing/2014/main" id="{B861E173-E780-48B8-8552-0F1B8140CBBE}"/>
+              </a:ext>
+            </a:extLst>
+          </p:cNvPr>
+          <p:cNvSpPr txBox="1">
+            <a:spLocks/>
+          </p:cNvSpPr>
+          <p:nvPr/>
+        </p:nvSpPr>
+        <p:spPr bwMode="auto">
+          <a:xfrm>
+            <a:off x="1727200" y="274320"/>
+            <a:ext cx="10058400" cy="487363"/>
+          </a:xfrm>
+          <a:prstGeom prst="rect">
+            <a:avLst/>
+          </a:prstGeom>
+          <a:noFill/>
+          <a:ln>
+            <a:noFill/>
+          </a:ln>
+          <a:extLst>
+            <a:ext uri="{909E8E84-426E-40DD-AFC4-6F175D3DCCD1}">
+              <a14:hiddenFill xmlns:a14="http://schemas.microsoft.com/office/drawing/2010/main">
+                <a:solidFill>
+                  <a:srgbClr val="FFFFFF"/>
+                </a:solidFill>
+              </a14:hiddenFill>
+            </a:ext>
+            <a:ext uri="{91240B29-F687-4F45-9708-019B960494DF}">
+              <a14:hiddenLine xmlns:a14="http://schemas.microsoft.com/office/drawing/2010/main" w="9525">
+                <a:solidFill>
+                  <a:srgbClr val="000000"/>
+                </a:solidFill>
+                <a:miter lim="800000"/>
+                <a:headEnd/>
+                <a:tailEnd/>
+              </a14:hiddenLine>
+            </a:ext>
+          </a:extLst>
+        </p:spPr>
+        <p:txBody>
+          <a:bodyPr vert="horz" wrap="square" lIns="121899" tIns="60949" rIns="121899" bIns="60949" numCol="1" anchor="ctr" anchorCtr="0" compatLnSpc="1">
+            <a:prstTxWarp prst="textNoShape">
+              <a:avLst/>
+            </a:prstTxWarp>
+            <a:noAutofit/>
+          </a:bodyPr>
+          <a:lstStyle>
+            <a:lvl1pPr algn="l" rtl="0" eaLnBrk="1" fontAlgn="base" hangingPunct="1">
+              <a:spcBef>
+                <a:spcPct val="0"/>
+              </a:spcBef>
+              <a:spcAft>
+                <a:spcPct val="0"/>
+              </a:spcAft>
+              <a:defRPr sz="2200" kern="1200">
+                <a:solidFill>
+                  <a:schemeClr val="bg1"/>
+                </a:solidFill>
+                <a:latin typeface="Arial" pitchFamily="34" charset="0"/>
+                <a:ea typeface="+mj-ea"/>
+                <a:cs typeface="Arial" pitchFamily="34" charset="0"/>
+              </a:defRPr>
+            </a:lvl1pPr>
+            <a:lvl2pPr algn="l" rtl="0" eaLnBrk="1" fontAlgn="base" hangingPunct="1">
+              <a:spcBef>
+                <a:spcPct val="0"/>
+              </a:spcBef>
+              <a:spcAft>
+                <a:spcPct val="0"/>
+              </a:spcAft>
+              <a:defRPr sz="2900">
+                <a:solidFill>
+                  <a:schemeClr val="bg1"/>
+                </a:solidFill>
+                <a:latin typeface="Arial" pitchFamily="34" charset="0"/>
+                <a:cs typeface="Arial" pitchFamily="34" charset="0"/>
+              </a:defRPr>
+            </a:lvl2pPr>
+            <a:lvl3pPr algn="l" rtl="0" eaLnBrk="1" fontAlgn="base" hangingPunct="1">
+              <a:spcBef>
+                <a:spcPct val="0"/>
+              </a:spcBef>
+              <a:spcAft>
+                <a:spcPct val="0"/>
+              </a:spcAft>
+              <a:defRPr sz="2900">
+                <a:solidFill>
+                  <a:schemeClr val="bg1"/>
+                </a:solidFill>
+                <a:latin typeface="Arial" pitchFamily="34" charset="0"/>
+                <a:cs typeface="Arial" pitchFamily="34" charset="0"/>
+              </a:defRPr>
+            </a:lvl3pPr>
+            <a:lvl4pPr algn="l" rtl="0" eaLnBrk="1" fontAlgn="base" hangingPunct="1">
+              <a:spcBef>
+                <a:spcPct val="0"/>
+              </a:spcBef>
+              <a:spcAft>
+                <a:spcPct val="0"/>
+              </a:spcAft>
+              <a:defRPr sz="2900">
+                <a:solidFill>
+                  <a:schemeClr val="bg1"/>
+                </a:solidFill>
+                <a:latin typeface="Arial" pitchFamily="34" charset="0"/>
+                <a:cs typeface="Arial" pitchFamily="34" charset="0"/>
+              </a:defRPr>
+            </a:lvl4pPr>
+            <a:lvl5pPr algn="l" rtl="0" eaLnBrk="1" fontAlgn="base" hangingPunct="1">
+              <a:spcBef>
+                <a:spcPct val="0"/>
+              </a:spcBef>
+              <a:spcAft>
+                <a:spcPct val="0"/>
+              </a:spcAft>
+              <a:defRPr sz="2900">
+                <a:solidFill>
+                  <a:schemeClr val="bg1"/>
+                </a:solidFill>
+                <a:latin typeface="Arial" pitchFamily="34" charset="0"/>
+                <a:cs typeface="Arial" pitchFamily="34" charset="0"/>
+              </a:defRPr>
+            </a:lvl5pPr>
+            <a:lvl6pPr marL="609493" algn="l" rtl="0" eaLnBrk="1" fontAlgn="base" hangingPunct="1">
+              <a:spcBef>
+                <a:spcPct val="0"/>
+              </a:spcBef>
+              <a:spcAft>
+                <a:spcPct val="0"/>
+              </a:spcAft>
+              <a:defRPr sz="3700">
+                <a:solidFill>
+                  <a:schemeClr val="bg1"/>
+                </a:solidFill>
+                <a:latin typeface="Arial" pitchFamily="34" charset="0"/>
+                <a:cs typeface="Arial" pitchFamily="34" charset="0"/>
+              </a:defRPr>
+            </a:lvl6pPr>
+            <a:lvl7pPr marL="1218987" algn="l" rtl="0" eaLnBrk="1" fontAlgn="base" hangingPunct="1">
+              <a:spcBef>
+                <a:spcPct val="0"/>
+              </a:spcBef>
+              <a:spcAft>
+                <a:spcPct val="0"/>
+              </a:spcAft>
+              <a:defRPr sz="3700">
+                <a:solidFill>
+                  <a:schemeClr val="bg1"/>
+                </a:solidFill>
+                <a:latin typeface="Arial" pitchFamily="34" charset="0"/>
+                <a:cs typeface="Arial" pitchFamily="34" charset="0"/>
+              </a:defRPr>
+            </a:lvl7pPr>
+            <a:lvl8pPr marL="1828480" algn="l" rtl="0" eaLnBrk="1" fontAlgn="base" hangingPunct="1">
+              <a:spcBef>
+                <a:spcPct val="0"/>
+              </a:spcBef>
+              <a:spcAft>
+                <a:spcPct val="0"/>
+              </a:spcAft>
+              <a:defRPr sz="3700">
+                <a:solidFill>
+                  <a:schemeClr val="bg1"/>
+                </a:solidFill>
+                <a:latin typeface="Arial" pitchFamily="34" charset="0"/>
+                <a:cs typeface="Arial" pitchFamily="34" charset="0"/>
+              </a:defRPr>
+            </a:lvl8pPr>
+            <a:lvl9pPr marL="2437973" algn="l" rtl="0" eaLnBrk="1" fontAlgn="base" hangingPunct="1">
+              <a:spcBef>
+                <a:spcPct val="0"/>
+              </a:spcBef>
+              <a:spcAft>
+                <a:spcPct val="0"/>
+              </a:spcAft>
+              <a:defRPr sz="3700">
+                <a:solidFill>
+                  <a:schemeClr val="bg1"/>
+                </a:solidFill>
+                <a:latin typeface="Arial" pitchFamily="34" charset="0"/>
+                <a:cs typeface="Arial" pitchFamily="34" charset="0"/>
+              </a:defRPr>
+            </a:lvl9pPr>
+          </a:lstStyle>
+          <a:p>
+            <a:pPr lvl="0" defTabSz="914400"/>
+            <a:r>
+              <a:rPr lang="en-US" sz="2400" b="1" dirty="0">
+                <a:solidFill>
+                  <a:sysClr val="window" lastClr="FFFFFF"/>
+                </a:solidFill>
+              </a:rPr>
+              <a:t>Airbnb Toronto Data Analysis</a:t>
+            </a:r>
+            <a:br>
+              <a:rPr kumimoji="0" lang="en-US" sz="2400" b="0" i="0" u="none" strike="noStrike" kern="1200" cap="none" spc="0" normalizeH="0" baseline="0" noProof="0" dirty="0">
+                <a:ln>
+                  <a:noFill/>
+                </a:ln>
+                <a:solidFill>
+                  <a:sysClr val="window" lastClr="FFFFFF"/>
+                </a:solidFill>
+                <a:effectLst/>
+                <a:uLnTx/>
+                <a:uFillTx/>
+                <a:latin typeface="Arial" pitchFamily="34" charset="0"/>
+                <a:ea typeface="+mj-ea"/>
+                <a:cs typeface="Arial" pitchFamily="34" charset="0"/>
+              </a:rPr>
+            </a:br>
+            <a:r>
+              <a:rPr lang="en-GB" sz="2400" dirty="0">
+                <a:solidFill>
+                  <a:srgbClr val="FFDD3E"/>
+                </a:solidFill>
+              </a:rPr>
+              <a:t>Number of hosts listed as super hosts</a:t>
+            </a:r>
+            <a:endParaRPr kumimoji="0" lang="en-GB" sz="2200" b="0" i="0" u="none" strike="noStrike" kern="1200" cap="none" spc="0" normalizeH="0" baseline="0" noProof="0" dirty="0">
+              <a:ln>
+                <a:noFill/>
+              </a:ln>
+              <a:solidFill>
+                <a:srgbClr val="FFDD3E"/>
+              </a:solidFill>
+              <a:effectLst/>
+              <a:uLnTx/>
+              <a:uFillTx/>
+              <a:latin typeface="Arial" pitchFamily="34" charset="0"/>
+              <a:ea typeface="+mj-ea"/>
+              <a:cs typeface="Arial" pitchFamily="34" charset="0"/>
+            </a:endParaRPr>
+          </a:p>
+        </p:txBody>
+      </p:sp>
+      <p:pic>
+        <p:nvPicPr>
+          <p:cNvPr id="7" name="Picture 6">
+            <a:extLst>
+              <a:ext uri="{FF2B5EF4-FFF2-40B4-BE49-F238E27FC236}">
+                <a16:creationId xmlns:a16="http://schemas.microsoft.com/office/drawing/2014/main" id="{C1962C65-08DE-4716-A8AB-24F9B28FCC8C}"/>
+              </a:ext>
+            </a:extLst>
+          </p:cNvPr>
+          <p:cNvPicPr>
+            <a:picLocks noChangeAspect="1"/>
+          </p:cNvPicPr>
+          <p:nvPr/>
+        </p:nvPicPr>
+        <p:blipFill>
+          <a:blip r:embed="rId2"/>
+          <a:stretch>
+            <a:fillRect/>
+          </a:stretch>
+        </p:blipFill>
+        <p:spPr>
+          <a:xfrm>
+            <a:off x="6320068" y="1700424"/>
+            <a:ext cx="5609501" cy="3180645"/>
+          </a:xfrm>
+          <a:prstGeom prst="rect">
+            <a:avLst/>
+          </a:prstGeom>
+        </p:spPr>
+      </p:pic>
+      <p:pic>
+        <p:nvPicPr>
+          <p:cNvPr id="8" name="Picture 7">
+            <a:extLst>
+              <a:ext uri="{FF2B5EF4-FFF2-40B4-BE49-F238E27FC236}">
+                <a16:creationId xmlns:a16="http://schemas.microsoft.com/office/drawing/2014/main" id="{9BED9A64-EEA0-417C-AF64-32B16BB1BDD7}"/>
+              </a:ext>
+            </a:extLst>
+          </p:cNvPr>
+          <p:cNvPicPr>
+            <a:picLocks noChangeAspect="1"/>
+          </p:cNvPicPr>
+          <p:nvPr/>
+        </p:nvPicPr>
+        <p:blipFill>
+          <a:blip r:embed="rId3"/>
+          <a:stretch>
+            <a:fillRect/>
+          </a:stretch>
+        </p:blipFill>
+        <p:spPr>
+          <a:xfrm>
+            <a:off x="406916" y="1892332"/>
+            <a:ext cx="5609501" cy="2905953"/>
+          </a:xfrm>
+          <a:prstGeom prst="rect">
+            <a:avLst/>
+          </a:prstGeom>
+        </p:spPr>
+      </p:pic>
+      <p:sp>
+        <p:nvSpPr>
+          <p:cNvPr id="10" name="Content Placeholder 1">
+            <a:extLst>
+              <a:ext uri="{FF2B5EF4-FFF2-40B4-BE49-F238E27FC236}">
+                <a16:creationId xmlns:a16="http://schemas.microsoft.com/office/drawing/2014/main" id="{797A4B41-3A66-4640-8DD5-6B7F1B970AB1}"/>
+              </a:ext>
+            </a:extLst>
+          </p:cNvPr>
+          <p:cNvSpPr txBox="1">
+            <a:spLocks/>
+          </p:cNvSpPr>
+          <p:nvPr/>
+        </p:nvSpPr>
+        <p:spPr>
+          <a:xfrm>
+            <a:off x="2677093" y="4718849"/>
+            <a:ext cx="2827062" cy="365125"/>
+          </a:xfrm>
+          <a:prstGeom prst="rect">
+            <a:avLst/>
+          </a:prstGeom>
+          <a:ln>
+            <a:noFill/>
+          </a:ln>
+        </p:spPr>
+        <p:txBody>
+          <a:bodyPr vert="horz" lIns="91440" tIns="45720" rIns="91440" bIns="45720" rtlCol="0">
+            <a:noAutofit/>
+          </a:bodyPr>
+          <a:lstStyle>
+            <a:lvl1pPr marL="342900" indent="-342900" algn="l" defTabSz="914400" rtl="0" eaLnBrk="1" latinLnBrk="0" hangingPunct="1">
+              <a:spcBef>
+                <a:spcPct val="20000"/>
+              </a:spcBef>
+              <a:buClr>
+                <a:srgbClr val="4E84C4"/>
+              </a:buClr>
+              <a:buFont typeface="Wingdings" pitchFamily="2" charset="2"/>
+              <a:buChar char="§"/>
+              <a:defRPr sz="2200" kern="1200">
+                <a:solidFill>
+                  <a:schemeClr val="tx1"/>
+                </a:solidFill>
+                <a:latin typeface="Myriad Pro" pitchFamily="34" charset="0"/>
+                <a:ea typeface="+mn-ea"/>
+                <a:cs typeface="+mn-cs"/>
+              </a:defRPr>
+            </a:lvl1pPr>
+            <a:lvl2pPr marL="742950" indent="-285750" algn="l" defTabSz="914400" rtl="0" eaLnBrk="1" latinLnBrk="0" hangingPunct="1">
+              <a:spcBef>
+                <a:spcPct val="20000"/>
+              </a:spcBef>
+              <a:buClr>
+                <a:srgbClr val="4E84C4"/>
+              </a:buClr>
+              <a:buFont typeface="Myriad Pro" pitchFamily="34" charset="0"/>
+              <a:buChar char="–"/>
+              <a:defRPr sz="2000" kern="1200">
+                <a:solidFill>
+                  <a:schemeClr val="tx1"/>
+                </a:solidFill>
+                <a:latin typeface="Myriad Pro" pitchFamily="34" charset="0"/>
+                <a:ea typeface="+mn-ea"/>
+                <a:cs typeface="+mn-cs"/>
+              </a:defRPr>
+            </a:lvl2pPr>
+            <a:lvl3pPr marL="1143000" indent="-228600" algn="l" defTabSz="914400" rtl="0" eaLnBrk="1" latinLnBrk="0" hangingPunct="1">
+              <a:spcBef>
+                <a:spcPct val="20000"/>
+              </a:spcBef>
+              <a:buClr>
+                <a:srgbClr val="4E84C4"/>
+              </a:buClr>
+              <a:buFont typeface="Courier New" pitchFamily="49" charset="0"/>
+              <a:buChar char="o"/>
+              <a:defRPr sz="1800" kern="1200">
+                <a:solidFill>
+                  <a:schemeClr val="tx1"/>
+                </a:solidFill>
+                <a:latin typeface="Myriad Pro" pitchFamily="34" charset="0"/>
+                <a:ea typeface="+mn-ea"/>
+                <a:cs typeface="+mn-cs"/>
+              </a:defRPr>
+            </a:lvl3pPr>
+            <a:lvl4pPr marL="1600200" indent="-228600" algn="l" defTabSz="914400" rtl="0" eaLnBrk="1" latinLnBrk="0" hangingPunct="1">
+              <a:spcBef>
+                <a:spcPct val="20000"/>
+              </a:spcBef>
+              <a:buClr>
+                <a:srgbClr val="4E84C4"/>
+              </a:buClr>
+              <a:buFont typeface="Arial" pitchFamily="34" charset="0"/>
+              <a:buChar char="•"/>
+              <a:defRPr sz="1600" kern="1200">
+                <a:solidFill>
+                  <a:schemeClr val="tx1"/>
+                </a:solidFill>
+                <a:latin typeface="Myriad Pro" pitchFamily="34" charset="0"/>
+                <a:ea typeface="+mn-ea"/>
+                <a:cs typeface="+mn-cs"/>
+              </a:defRPr>
+            </a:lvl4pPr>
+            <a:lvl5pPr marL="2057400" indent="-228600" algn="l" defTabSz="914400" rtl="0" eaLnBrk="1" latinLnBrk="0" hangingPunct="1">
+              <a:spcBef>
+                <a:spcPct val="20000"/>
+              </a:spcBef>
+              <a:buFont typeface="Arial" pitchFamily="34" charset="0"/>
+              <a:buChar char="»"/>
+              <a:defRPr sz="2000" kern="1200">
+                <a:solidFill>
+                  <a:schemeClr val="tx1"/>
+                </a:solidFill>
+                <a:latin typeface="Myriad Pro" pitchFamily="34" charset="0"/>
+                <a:ea typeface="+mn-ea"/>
+                <a:cs typeface="+mn-cs"/>
+              </a:defRPr>
+            </a:lvl5pPr>
+            <a:lvl6pPr marL="2514600" indent="-228600" algn="l" defTabSz="914400" rtl="0" eaLnBrk="1" latinLnBrk="0" hangingPunct="1">
+              <a:spcBef>
+                <a:spcPct val="20000"/>
+              </a:spcBef>
+              <a:buFont typeface="Arial" pitchFamily="34" charset="0"/>
+              <a:buChar char="•"/>
+              <a:defRPr sz="2000" kern="1200">
+                <a:solidFill>
+                  <a:schemeClr val="tx1"/>
+                </a:solidFill>
+                <a:latin typeface="+mn-lt"/>
+                <a:ea typeface="+mn-ea"/>
+                <a:cs typeface="+mn-cs"/>
+              </a:defRPr>
+            </a:lvl6pPr>
+            <a:lvl7pPr marL="2971800" indent="-228600" algn="l" defTabSz="914400" rtl="0" eaLnBrk="1" latinLnBrk="0" hangingPunct="1">
+              <a:spcBef>
+                <a:spcPct val="20000"/>
+              </a:spcBef>
+              <a:buFont typeface="Arial" pitchFamily="34" charset="0"/>
+              <a:buChar char="•"/>
+              <a:defRPr sz="2000" kern="1200">
+                <a:solidFill>
+                  <a:schemeClr val="tx1"/>
+                </a:solidFill>
+                <a:latin typeface="+mn-lt"/>
+                <a:ea typeface="+mn-ea"/>
+                <a:cs typeface="+mn-cs"/>
+              </a:defRPr>
+            </a:lvl7pPr>
+            <a:lvl8pPr marL="3429000" indent="-228600" algn="l" defTabSz="914400" rtl="0" eaLnBrk="1" latinLnBrk="0" hangingPunct="1">
+              <a:spcBef>
+                <a:spcPct val="20000"/>
+              </a:spcBef>
+              <a:buFont typeface="Arial" pitchFamily="34" charset="0"/>
+              <a:buChar char="•"/>
+              <a:defRPr sz="2000" kern="1200">
+                <a:solidFill>
+                  <a:schemeClr val="tx1"/>
+                </a:solidFill>
+                <a:latin typeface="+mn-lt"/>
+                <a:ea typeface="+mn-ea"/>
+                <a:cs typeface="+mn-cs"/>
+              </a:defRPr>
+            </a:lvl8pPr>
+            <a:lvl9pPr marL="3886200" indent="-228600" algn="l" defTabSz="914400" rtl="0" eaLnBrk="1" latinLnBrk="0" hangingPunct="1">
+              <a:spcBef>
+                <a:spcPct val="20000"/>
+              </a:spcBef>
+              <a:buFont typeface="Arial" pitchFamily="34" charset="0"/>
+              <a:buChar char="•"/>
+              <a:defRPr sz="2000" kern="1200">
+                <a:solidFill>
+                  <a:schemeClr val="tx1"/>
+                </a:solidFill>
+                <a:latin typeface="+mn-lt"/>
+                <a:ea typeface="+mn-ea"/>
+                <a:cs typeface="+mn-cs"/>
+              </a:defRPr>
+            </a:lvl9pPr>
+          </a:lstStyle>
+          <a:p>
+            <a:pPr marL="0" indent="0" fontAlgn="base">
+              <a:spcAft>
+                <a:spcPct val="0"/>
+              </a:spcAft>
+              <a:buNone/>
+            </a:pPr>
+            <a:r>
+              <a:rPr lang="en-US" sz="1400" dirty="0">
+                <a:solidFill>
+                  <a:srgbClr val="000000"/>
+                </a:solidFill>
+                <a:latin typeface="Arial" panose="020B0604020202020204" pitchFamily="34" charset="0"/>
+                <a:cs typeface="Arial" pitchFamily="34" charset="0"/>
+              </a:rPr>
+              <a:t>Toronto</a:t>
+            </a:r>
+          </a:p>
+        </p:txBody>
+      </p:sp>
+      <p:sp>
+        <p:nvSpPr>
+          <p:cNvPr id="12" name="Content Placeholder 1">
+            <a:extLst>
+              <a:ext uri="{FF2B5EF4-FFF2-40B4-BE49-F238E27FC236}">
+                <a16:creationId xmlns:a16="http://schemas.microsoft.com/office/drawing/2014/main" id="{1BD0985B-A085-4231-837C-8F006A4CBDBA}"/>
+              </a:ext>
+            </a:extLst>
+          </p:cNvPr>
+          <p:cNvSpPr txBox="1">
+            <a:spLocks/>
+          </p:cNvSpPr>
+          <p:nvPr/>
+        </p:nvSpPr>
+        <p:spPr>
+          <a:xfrm>
+            <a:off x="8990595" y="4778407"/>
+            <a:ext cx="2827062" cy="365125"/>
+          </a:xfrm>
+          <a:prstGeom prst="rect">
+            <a:avLst/>
+          </a:prstGeom>
+          <a:ln>
+            <a:noFill/>
+          </a:ln>
+        </p:spPr>
+        <p:txBody>
+          <a:bodyPr vert="horz" lIns="91440" tIns="45720" rIns="91440" bIns="45720" rtlCol="0">
+            <a:noAutofit/>
+          </a:bodyPr>
+          <a:lstStyle>
+            <a:lvl1pPr marL="342900" indent="-342900" algn="l" defTabSz="914400" rtl="0" eaLnBrk="1" latinLnBrk="0" hangingPunct="1">
+              <a:spcBef>
+                <a:spcPct val="20000"/>
+              </a:spcBef>
+              <a:buClr>
+                <a:srgbClr val="4E84C4"/>
+              </a:buClr>
+              <a:buFont typeface="Wingdings" pitchFamily="2" charset="2"/>
+              <a:buChar char="§"/>
+              <a:defRPr sz="2200" kern="1200">
+                <a:solidFill>
+                  <a:schemeClr val="tx1"/>
+                </a:solidFill>
+                <a:latin typeface="Myriad Pro" pitchFamily="34" charset="0"/>
+                <a:ea typeface="+mn-ea"/>
+                <a:cs typeface="+mn-cs"/>
+              </a:defRPr>
+            </a:lvl1pPr>
+            <a:lvl2pPr marL="742950" indent="-285750" algn="l" defTabSz="914400" rtl="0" eaLnBrk="1" latinLnBrk="0" hangingPunct="1">
+              <a:spcBef>
+                <a:spcPct val="20000"/>
+              </a:spcBef>
+              <a:buClr>
+                <a:srgbClr val="4E84C4"/>
+              </a:buClr>
+              <a:buFont typeface="Myriad Pro" pitchFamily="34" charset="0"/>
+              <a:buChar char="–"/>
+              <a:defRPr sz="2000" kern="1200">
+                <a:solidFill>
+                  <a:schemeClr val="tx1"/>
+                </a:solidFill>
+                <a:latin typeface="Myriad Pro" pitchFamily="34" charset="0"/>
+                <a:ea typeface="+mn-ea"/>
+                <a:cs typeface="+mn-cs"/>
+              </a:defRPr>
+            </a:lvl2pPr>
+            <a:lvl3pPr marL="1143000" indent="-228600" algn="l" defTabSz="914400" rtl="0" eaLnBrk="1" latinLnBrk="0" hangingPunct="1">
+              <a:spcBef>
+                <a:spcPct val="20000"/>
+              </a:spcBef>
+              <a:buClr>
+                <a:srgbClr val="4E84C4"/>
+              </a:buClr>
+              <a:buFont typeface="Courier New" pitchFamily="49" charset="0"/>
+              <a:buChar char="o"/>
+              <a:defRPr sz="1800" kern="1200">
+                <a:solidFill>
+                  <a:schemeClr val="tx1"/>
+                </a:solidFill>
+                <a:latin typeface="Myriad Pro" pitchFamily="34" charset="0"/>
+                <a:ea typeface="+mn-ea"/>
+                <a:cs typeface="+mn-cs"/>
+              </a:defRPr>
+            </a:lvl3pPr>
+            <a:lvl4pPr marL="1600200" indent="-228600" algn="l" defTabSz="914400" rtl="0" eaLnBrk="1" latinLnBrk="0" hangingPunct="1">
+              <a:spcBef>
+                <a:spcPct val="20000"/>
+              </a:spcBef>
+              <a:buClr>
+                <a:srgbClr val="4E84C4"/>
+              </a:buClr>
+              <a:buFont typeface="Arial" pitchFamily="34" charset="0"/>
+              <a:buChar char="•"/>
+              <a:defRPr sz="1600" kern="1200">
+                <a:solidFill>
+                  <a:schemeClr val="tx1"/>
+                </a:solidFill>
+                <a:latin typeface="Myriad Pro" pitchFamily="34" charset="0"/>
+                <a:ea typeface="+mn-ea"/>
+                <a:cs typeface="+mn-cs"/>
+              </a:defRPr>
+            </a:lvl4pPr>
+            <a:lvl5pPr marL="2057400" indent="-228600" algn="l" defTabSz="914400" rtl="0" eaLnBrk="1" latinLnBrk="0" hangingPunct="1">
+              <a:spcBef>
+                <a:spcPct val="20000"/>
+              </a:spcBef>
+              <a:buFont typeface="Arial" pitchFamily="34" charset="0"/>
+              <a:buChar char="»"/>
+              <a:defRPr sz="2000" kern="1200">
+                <a:solidFill>
+                  <a:schemeClr val="tx1"/>
+                </a:solidFill>
+                <a:latin typeface="Myriad Pro" pitchFamily="34" charset="0"/>
+                <a:ea typeface="+mn-ea"/>
+                <a:cs typeface="+mn-cs"/>
+              </a:defRPr>
+            </a:lvl5pPr>
+            <a:lvl6pPr marL="2514600" indent="-228600" algn="l" defTabSz="914400" rtl="0" eaLnBrk="1" latinLnBrk="0" hangingPunct="1">
+              <a:spcBef>
+                <a:spcPct val="20000"/>
+              </a:spcBef>
+              <a:buFont typeface="Arial" pitchFamily="34" charset="0"/>
+              <a:buChar char="•"/>
+              <a:defRPr sz="2000" kern="1200">
+                <a:solidFill>
+                  <a:schemeClr val="tx1"/>
+                </a:solidFill>
+                <a:latin typeface="+mn-lt"/>
+                <a:ea typeface="+mn-ea"/>
+                <a:cs typeface="+mn-cs"/>
+              </a:defRPr>
+            </a:lvl6pPr>
+            <a:lvl7pPr marL="2971800" indent="-228600" algn="l" defTabSz="914400" rtl="0" eaLnBrk="1" latinLnBrk="0" hangingPunct="1">
+              <a:spcBef>
+                <a:spcPct val="20000"/>
+              </a:spcBef>
+              <a:buFont typeface="Arial" pitchFamily="34" charset="0"/>
+              <a:buChar char="•"/>
+              <a:defRPr sz="2000" kern="1200">
+                <a:solidFill>
+                  <a:schemeClr val="tx1"/>
+                </a:solidFill>
+                <a:latin typeface="+mn-lt"/>
+                <a:ea typeface="+mn-ea"/>
+                <a:cs typeface="+mn-cs"/>
+              </a:defRPr>
+            </a:lvl7pPr>
+            <a:lvl8pPr marL="3429000" indent="-228600" algn="l" defTabSz="914400" rtl="0" eaLnBrk="1" latinLnBrk="0" hangingPunct="1">
+              <a:spcBef>
+                <a:spcPct val="20000"/>
+              </a:spcBef>
+              <a:buFont typeface="Arial" pitchFamily="34" charset="0"/>
+              <a:buChar char="•"/>
+              <a:defRPr sz="2000" kern="1200">
+                <a:solidFill>
+                  <a:schemeClr val="tx1"/>
+                </a:solidFill>
+                <a:latin typeface="+mn-lt"/>
+                <a:ea typeface="+mn-ea"/>
+                <a:cs typeface="+mn-cs"/>
+              </a:defRPr>
+            </a:lvl8pPr>
+            <a:lvl9pPr marL="3886200" indent="-228600" algn="l" defTabSz="914400" rtl="0" eaLnBrk="1" latinLnBrk="0" hangingPunct="1">
+              <a:spcBef>
+                <a:spcPct val="20000"/>
+              </a:spcBef>
+              <a:buFont typeface="Arial" pitchFamily="34" charset="0"/>
+              <a:buChar char="•"/>
+              <a:defRPr sz="2000" kern="1200">
+                <a:solidFill>
+                  <a:schemeClr val="tx1"/>
+                </a:solidFill>
+                <a:latin typeface="+mn-lt"/>
+                <a:ea typeface="+mn-ea"/>
+                <a:cs typeface="+mn-cs"/>
+              </a:defRPr>
+            </a:lvl9pPr>
+          </a:lstStyle>
+          <a:p>
+            <a:pPr marL="0" indent="0" fontAlgn="base">
+              <a:spcAft>
+                <a:spcPct val="0"/>
+              </a:spcAft>
+              <a:buNone/>
+            </a:pPr>
+            <a:r>
+              <a:rPr lang="en-US" sz="1400" dirty="0">
+                <a:solidFill>
+                  <a:srgbClr val="000000"/>
+                </a:solidFill>
+                <a:latin typeface="Arial" panose="020B0604020202020204" pitchFamily="34" charset="0"/>
+                <a:cs typeface="Arial" pitchFamily="34" charset="0"/>
+              </a:rPr>
+              <a:t>Quebec</a:t>
+            </a:r>
+          </a:p>
+        </p:txBody>
+      </p:sp>
+    </p:spTree>
+    <p:extLst>
+      <p:ext uri="{BB962C8B-B14F-4D97-AF65-F5344CB8AC3E}">
+        <p14:creationId xmlns:p14="http://schemas.microsoft.com/office/powerpoint/2010/main" val="2895981177"/>
+      </p:ext>
+    </p:extLst>
+  </p:cSld>
+  <p:clrMapOvr>
+    <a:masterClrMapping/>
+  </p:clrMapOvr>
+</p:sld>
+</file>
+
+<file path=ppt/slides/slide12.xml><?xml version="1.0" encoding="utf-8"?>
+<p:sld xmlns:a="http://schemas.openxmlformats.org/drawingml/2006/main" xmlns:r="http://schemas.openxmlformats.org/officeDocument/2006/relationships" xmlns:p="http://schemas.openxmlformats.org/presentationml/2006/main">
+  <p:cSld>
+    <p:spTree>
+      <p:nvGrpSpPr>
+        <p:cNvPr id="1" name=""/>
+        <p:cNvGrpSpPr/>
+        <p:nvPr/>
+      </p:nvGrpSpPr>
+      <p:grpSpPr>
+        <a:xfrm>
+          <a:off x="0" y="0"/>
+          <a:ext cx="0" cy="0"/>
+          <a:chOff x="0" y="0"/>
+          <a:chExt cx="0" cy="0"/>
+        </a:xfrm>
+      </p:grpSpPr>
+      <p:sp>
+        <p:nvSpPr>
+          <p:cNvPr id="6" name="Rectangle 5">
+            <a:extLst>
+              <a:ext uri="{FF2B5EF4-FFF2-40B4-BE49-F238E27FC236}">
+                <a16:creationId xmlns:a16="http://schemas.microsoft.com/office/drawing/2014/main" id="{8E48BA95-CB03-4C0F-BD3B-653DBB7534FE}"/>
+              </a:ext>
+            </a:extLst>
+          </p:cNvPr>
+          <p:cNvSpPr/>
+          <p:nvPr/>
+        </p:nvSpPr>
+        <p:spPr>
+          <a:xfrm>
+            <a:off x="0" y="1039511"/>
+            <a:ext cx="12192000" cy="5228948"/>
+          </a:xfrm>
+          <a:prstGeom prst="rect">
+            <a:avLst/>
+          </a:prstGeom>
+          <a:gradFill flip="none" rotWithShape="1">
+            <a:gsLst>
+              <a:gs pos="0">
+                <a:schemeClr val="tx1">
+                  <a:shade val="30000"/>
+                  <a:satMod val="115000"/>
+                </a:schemeClr>
+              </a:gs>
+              <a:gs pos="50000">
+                <a:schemeClr val="tx1">
+                  <a:shade val="67500"/>
+                  <a:satMod val="115000"/>
+                </a:schemeClr>
+              </a:gs>
+              <a:gs pos="100000">
+                <a:schemeClr val="tx1">
+                  <a:shade val="100000"/>
+                  <a:satMod val="115000"/>
+                </a:schemeClr>
+              </a:gs>
+            </a:gsLst>
+            <a:lin ang="13500000" scaled="1"/>
+            <a:tileRect/>
+          </a:gradFill>
+          <a:ln>
+            <a:noFill/>
+          </a:ln>
+        </p:spPr>
+        <p:style>
+          <a:lnRef idx="2">
+            <a:schemeClr val="accent1">
+              <a:shade val="50000"/>
+            </a:schemeClr>
+          </a:lnRef>
+          <a:fillRef idx="1">
+            <a:schemeClr val="accent1"/>
+          </a:fillRef>
+          <a:effectRef idx="0">
+            <a:schemeClr val="accent1"/>
+          </a:effectRef>
+          <a:fontRef idx="minor">
+            <a:schemeClr val="lt1"/>
+          </a:fontRef>
+        </p:style>
+        <p:txBody>
+          <a:bodyPr rtlCol="0" anchor="ctr"/>
+          <a:lstStyle/>
+          <a:p>
+            <a:pPr algn="ctr"/>
+            <a:endParaRPr lang="en-CA" dirty="0"/>
+          </a:p>
+        </p:txBody>
+      </p:sp>
+      <p:sp>
+        <p:nvSpPr>
+          <p:cNvPr id="14" name="Footer Placeholder 13">
+            <a:extLst>
+              <a:ext uri="{FF2B5EF4-FFF2-40B4-BE49-F238E27FC236}">
+                <a16:creationId xmlns:a16="http://schemas.microsoft.com/office/drawing/2014/main" id="{ADDA3989-0382-4CE8-8B5E-5C4C5EE60396}"/>
+              </a:ext>
+            </a:extLst>
+          </p:cNvPr>
+          <p:cNvSpPr>
+            <a:spLocks noGrp="1"/>
+          </p:cNvSpPr>
+          <p:nvPr>
+            <p:ph type="ftr" sz="quarter" idx="11"/>
+          </p:nvPr>
+        </p:nvSpPr>
+        <p:spPr/>
+        <p:txBody>
+          <a:bodyPr/>
+          <a:lstStyle/>
+          <a:p>
+            <a:r>
+              <a:rPr lang="en-US" dirty="0"/>
+              <a:t>Airbnb Toronto Data Analysis</a:t>
+            </a:r>
+          </a:p>
+        </p:txBody>
+      </p:sp>
+      <p:sp>
+        <p:nvSpPr>
+          <p:cNvPr id="15" name="Slide Number Placeholder 14">
+            <a:extLst>
+              <a:ext uri="{FF2B5EF4-FFF2-40B4-BE49-F238E27FC236}">
+                <a16:creationId xmlns:a16="http://schemas.microsoft.com/office/drawing/2014/main" id="{7DAE8B8A-1BBE-4F06-8589-01CD9CAE9D86}"/>
+              </a:ext>
+            </a:extLst>
+          </p:cNvPr>
+          <p:cNvSpPr>
+            <a:spLocks noGrp="1"/>
+          </p:cNvSpPr>
+          <p:nvPr>
+            <p:ph type="sldNum" sz="quarter" idx="12"/>
+          </p:nvPr>
+        </p:nvSpPr>
+        <p:spPr/>
+        <p:txBody>
+          <a:bodyPr/>
+          <a:lstStyle/>
+          <a:p>
+            <a:fld id="{D57F1E4F-1CFF-5643-939E-217C01CDF565}" type="slidenum">
+              <a:rPr lang="en-US" smtClean="0"/>
+              <a:pPr/>
+              <a:t>12</a:t>
+            </a:fld>
+            <a:endParaRPr lang="en-US" dirty="0"/>
+          </a:p>
+        </p:txBody>
+      </p:sp>
+      <p:sp>
+        <p:nvSpPr>
+          <p:cNvPr id="9" name="Title 1">
+            <a:extLst>
+              <a:ext uri="{FF2B5EF4-FFF2-40B4-BE49-F238E27FC236}">
+                <a16:creationId xmlns:a16="http://schemas.microsoft.com/office/drawing/2014/main" id="{B861E173-E780-48B8-8552-0F1B8140CBBE}"/>
+              </a:ext>
+            </a:extLst>
+          </p:cNvPr>
+          <p:cNvSpPr txBox="1">
+            <a:spLocks/>
+          </p:cNvSpPr>
+          <p:nvPr/>
+        </p:nvSpPr>
+        <p:spPr bwMode="auto">
+          <a:xfrm>
+            <a:off x="1727200" y="274320"/>
+            <a:ext cx="10058400" cy="487363"/>
+          </a:xfrm>
+          <a:prstGeom prst="rect">
+            <a:avLst/>
+          </a:prstGeom>
+          <a:noFill/>
+          <a:ln>
+            <a:noFill/>
+          </a:ln>
+          <a:extLst>
+            <a:ext uri="{909E8E84-426E-40DD-AFC4-6F175D3DCCD1}">
+              <a14:hiddenFill xmlns:a14="http://schemas.microsoft.com/office/drawing/2010/main">
+                <a:solidFill>
+                  <a:srgbClr val="FFFFFF"/>
+                </a:solidFill>
+              </a14:hiddenFill>
+            </a:ext>
+            <a:ext uri="{91240B29-F687-4F45-9708-019B960494DF}">
+              <a14:hiddenLine xmlns:a14="http://schemas.microsoft.com/office/drawing/2010/main" w="9525">
+                <a:solidFill>
+                  <a:srgbClr val="000000"/>
+                </a:solidFill>
+                <a:miter lim="800000"/>
+                <a:headEnd/>
+                <a:tailEnd/>
+              </a14:hiddenLine>
+            </a:ext>
+          </a:extLst>
+        </p:spPr>
+        <p:txBody>
+          <a:bodyPr vert="horz" wrap="square" lIns="121899" tIns="60949" rIns="121899" bIns="60949" numCol="1" anchor="ctr" anchorCtr="0" compatLnSpc="1">
+            <a:prstTxWarp prst="textNoShape">
+              <a:avLst/>
+            </a:prstTxWarp>
+            <a:noAutofit/>
+          </a:bodyPr>
+          <a:lstStyle>
+            <a:lvl1pPr algn="l" rtl="0" eaLnBrk="1" fontAlgn="base" hangingPunct="1">
+              <a:spcBef>
+                <a:spcPct val="0"/>
+              </a:spcBef>
+              <a:spcAft>
+                <a:spcPct val="0"/>
+              </a:spcAft>
+              <a:defRPr sz="2200" kern="1200">
+                <a:solidFill>
+                  <a:schemeClr val="bg1"/>
+                </a:solidFill>
+                <a:latin typeface="Arial" pitchFamily="34" charset="0"/>
+                <a:ea typeface="+mj-ea"/>
+                <a:cs typeface="Arial" pitchFamily="34" charset="0"/>
+              </a:defRPr>
+            </a:lvl1pPr>
+            <a:lvl2pPr algn="l" rtl="0" eaLnBrk="1" fontAlgn="base" hangingPunct="1">
+              <a:spcBef>
+                <a:spcPct val="0"/>
+              </a:spcBef>
+              <a:spcAft>
+                <a:spcPct val="0"/>
+              </a:spcAft>
+              <a:defRPr sz="2900">
+                <a:solidFill>
+                  <a:schemeClr val="bg1"/>
+                </a:solidFill>
+                <a:latin typeface="Arial" pitchFamily="34" charset="0"/>
+                <a:cs typeface="Arial" pitchFamily="34" charset="0"/>
+              </a:defRPr>
+            </a:lvl2pPr>
+            <a:lvl3pPr algn="l" rtl="0" eaLnBrk="1" fontAlgn="base" hangingPunct="1">
+              <a:spcBef>
+                <a:spcPct val="0"/>
+              </a:spcBef>
+              <a:spcAft>
+                <a:spcPct val="0"/>
+              </a:spcAft>
+              <a:defRPr sz="2900">
+                <a:solidFill>
+                  <a:schemeClr val="bg1"/>
+                </a:solidFill>
+                <a:latin typeface="Arial" pitchFamily="34" charset="0"/>
+                <a:cs typeface="Arial" pitchFamily="34" charset="0"/>
+              </a:defRPr>
+            </a:lvl3pPr>
+            <a:lvl4pPr algn="l" rtl="0" eaLnBrk="1" fontAlgn="base" hangingPunct="1">
+              <a:spcBef>
+                <a:spcPct val="0"/>
+              </a:spcBef>
+              <a:spcAft>
+                <a:spcPct val="0"/>
+              </a:spcAft>
+              <a:defRPr sz="2900">
+                <a:solidFill>
+                  <a:schemeClr val="bg1"/>
+                </a:solidFill>
+                <a:latin typeface="Arial" pitchFamily="34" charset="0"/>
+                <a:cs typeface="Arial" pitchFamily="34" charset="0"/>
+              </a:defRPr>
+            </a:lvl4pPr>
+            <a:lvl5pPr algn="l" rtl="0" eaLnBrk="1" fontAlgn="base" hangingPunct="1">
+              <a:spcBef>
+                <a:spcPct val="0"/>
+              </a:spcBef>
+              <a:spcAft>
+                <a:spcPct val="0"/>
+              </a:spcAft>
+              <a:defRPr sz="2900">
+                <a:solidFill>
+                  <a:schemeClr val="bg1"/>
+                </a:solidFill>
+                <a:latin typeface="Arial" pitchFamily="34" charset="0"/>
+                <a:cs typeface="Arial" pitchFamily="34" charset="0"/>
+              </a:defRPr>
+            </a:lvl5pPr>
+            <a:lvl6pPr marL="609493" algn="l" rtl="0" eaLnBrk="1" fontAlgn="base" hangingPunct="1">
+              <a:spcBef>
+                <a:spcPct val="0"/>
+              </a:spcBef>
+              <a:spcAft>
+                <a:spcPct val="0"/>
+              </a:spcAft>
+              <a:defRPr sz="3700">
+                <a:solidFill>
+                  <a:schemeClr val="bg1"/>
+                </a:solidFill>
+                <a:latin typeface="Arial" pitchFamily="34" charset="0"/>
+                <a:cs typeface="Arial" pitchFamily="34" charset="0"/>
+              </a:defRPr>
+            </a:lvl6pPr>
+            <a:lvl7pPr marL="1218987" algn="l" rtl="0" eaLnBrk="1" fontAlgn="base" hangingPunct="1">
+              <a:spcBef>
+                <a:spcPct val="0"/>
+              </a:spcBef>
+              <a:spcAft>
+                <a:spcPct val="0"/>
+              </a:spcAft>
+              <a:defRPr sz="3700">
+                <a:solidFill>
+                  <a:schemeClr val="bg1"/>
+                </a:solidFill>
+                <a:latin typeface="Arial" pitchFamily="34" charset="0"/>
+                <a:cs typeface="Arial" pitchFamily="34" charset="0"/>
+              </a:defRPr>
+            </a:lvl7pPr>
+            <a:lvl8pPr marL="1828480" algn="l" rtl="0" eaLnBrk="1" fontAlgn="base" hangingPunct="1">
+              <a:spcBef>
+                <a:spcPct val="0"/>
+              </a:spcBef>
+              <a:spcAft>
+                <a:spcPct val="0"/>
+              </a:spcAft>
+              <a:defRPr sz="3700">
+                <a:solidFill>
+                  <a:schemeClr val="bg1"/>
+                </a:solidFill>
+                <a:latin typeface="Arial" pitchFamily="34" charset="0"/>
+                <a:cs typeface="Arial" pitchFamily="34" charset="0"/>
+              </a:defRPr>
+            </a:lvl8pPr>
+            <a:lvl9pPr marL="2437973" algn="l" rtl="0" eaLnBrk="1" fontAlgn="base" hangingPunct="1">
+              <a:spcBef>
+                <a:spcPct val="0"/>
+              </a:spcBef>
+              <a:spcAft>
+                <a:spcPct val="0"/>
+              </a:spcAft>
+              <a:defRPr sz="3700">
+                <a:solidFill>
+                  <a:schemeClr val="bg1"/>
+                </a:solidFill>
+                <a:latin typeface="Arial" pitchFamily="34" charset="0"/>
+                <a:cs typeface="Arial" pitchFamily="34" charset="0"/>
+              </a:defRPr>
+            </a:lvl9pPr>
+          </a:lstStyle>
+          <a:p>
+            <a:pPr lvl="0" defTabSz="914400"/>
+            <a:r>
+              <a:rPr lang="en-US" sz="2400" b="1" dirty="0">
+                <a:solidFill>
+                  <a:sysClr val="window" lastClr="FFFFFF"/>
+                </a:solidFill>
+              </a:rPr>
+              <a:t>Airbnb Toronto Data Analysis</a:t>
+            </a:r>
+            <a:br>
+              <a:rPr kumimoji="0" lang="en-US" sz="2400" b="0" i="0" u="none" strike="noStrike" kern="1200" cap="none" spc="0" normalizeH="0" baseline="0" noProof="0" dirty="0">
+                <a:ln>
+                  <a:noFill/>
+                </a:ln>
+                <a:solidFill>
+                  <a:sysClr val="window" lastClr="FFFFFF"/>
+                </a:solidFill>
+                <a:effectLst/>
+                <a:uLnTx/>
+                <a:uFillTx/>
+                <a:latin typeface="Arial" pitchFamily="34" charset="0"/>
+                <a:ea typeface="+mj-ea"/>
+                <a:cs typeface="Arial" pitchFamily="34" charset="0"/>
+              </a:rPr>
+            </a:br>
+            <a:r>
+              <a:rPr kumimoji="0" lang="en-GB" sz="2400" b="0" i="0" u="none" strike="noStrike" kern="1200" cap="none" spc="0" normalizeH="0" baseline="0" noProof="0" dirty="0">
+                <a:ln>
+                  <a:noFill/>
+                </a:ln>
+                <a:solidFill>
+                  <a:srgbClr val="FFDD3E"/>
+                </a:solidFill>
+                <a:effectLst/>
+                <a:uLnTx/>
+                <a:uFillTx/>
+                <a:latin typeface="Arial" pitchFamily="34" charset="0"/>
+                <a:ea typeface="+mj-ea"/>
+                <a:cs typeface="Arial" pitchFamily="34" charset="0"/>
+              </a:rPr>
+              <a:t>Few of the Next Possible Steps</a:t>
+            </a:r>
+            <a:endParaRPr kumimoji="0" lang="en-GB" sz="2200" b="0" i="0" u="none" strike="noStrike" kern="1200" cap="none" spc="0" normalizeH="0" baseline="0" noProof="0" dirty="0">
+              <a:ln>
+                <a:noFill/>
+              </a:ln>
+              <a:solidFill>
+                <a:srgbClr val="FFDD3E"/>
+              </a:solidFill>
+              <a:effectLst/>
+              <a:uLnTx/>
+              <a:uFillTx/>
+              <a:latin typeface="Arial" pitchFamily="34" charset="0"/>
+              <a:ea typeface="+mj-ea"/>
+              <a:cs typeface="Arial" pitchFamily="34" charset="0"/>
+            </a:endParaRPr>
+          </a:p>
+        </p:txBody>
+      </p:sp>
+      <p:sp>
+        <p:nvSpPr>
+          <p:cNvPr id="7" name="Content Placeholder 1">
+            <a:extLst>
+              <a:ext uri="{FF2B5EF4-FFF2-40B4-BE49-F238E27FC236}">
+                <a16:creationId xmlns:a16="http://schemas.microsoft.com/office/drawing/2014/main" id="{B180D5D5-4FF9-4A7F-A02D-CDAED8542316}"/>
+              </a:ext>
+            </a:extLst>
+          </p:cNvPr>
+          <p:cNvSpPr txBox="1">
+            <a:spLocks/>
+          </p:cNvSpPr>
+          <p:nvPr/>
+        </p:nvSpPr>
+        <p:spPr>
+          <a:xfrm>
+            <a:off x="1030153" y="1914707"/>
+            <a:ext cx="9563036" cy="1597152"/>
+          </a:xfrm>
+          <a:prstGeom prst="rect">
+            <a:avLst/>
+          </a:prstGeom>
+          <a:ln>
+            <a:noFill/>
+          </a:ln>
+        </p:spPr>
+        <p:txBody>
+          <a:bodyPr vert="horz" lIns="91440" tIns="45720" rIns="91440" bIns="45720" rtlCol="0">
+            <a:noAutofit/>
+          </a:bodyPr>
+          <a:lstStyle>
+            <a:lvl1pPr marL="342900" indent="-342900" algn="l" defTabSz="914400" rtl="0" eaLnBrk="1" latinLnBrk="0" hangingPunct="1">
+              <a:spcBef>
+                <a:spcPct val="20000"/>
+              </a:spcBef>
+              <a:buClr>
+                <a:srgbClr val="4E84C4"/>
+              </a:buClr>
+              <a:buFont typeface="Wingdings" pitchFamily="2" charset="2"/>
+              <a:buChar char="§"/>
+              <a:defRPr sz="2200" kern="1200">
+                <a:solidFill>
+                  <a:schemeClr val="tx1"/>
+                </a:solidFill>
+                <a:latin typeface="Myriad Pro" pitchFamily="34" charset="0"/>
+                <a:ea typeface="+mn-ea"/>
+                <a:cs typeface="+mn-cs"/>
+              </a:defRPr>
+            </a:lvl1pPr>
+            <a:lvl2pPr marL="742950" indent="-285750" algn="l" defTabSz="914400" rtl="0" eaLnBrk="1" latinLnBrk="0" hangingPunct="1">
+              <a:spcBef>
+                <a:spcPct val="20000"/>
+              </a:spcBef>
+              <a:buClr>
+                <a:srgbClr val="4E84C4"/>
+              </a:buClr>
+              <a:buFont typeface="Myriad Pro" pitchFamily="34" charset="0"/>
+              <a:buChar char="–"/>
+              <a:defRPr sz="2000" kern="1200">
+                <a:solidFill>
+                  <a:schemeClr val="tx1"/>
+                </a:solidFill>
+                <a:latin typeface="Myriad Pro" pitchFamily="34" charset="0"/>
+                <a:ea typeface="+mn-ea"/>
+                <a:cs typeface="+mn-cs"/>
+              </a:defRPr>
+            </a:lvl2pPr>
+            <a:lvl3pPr marL="1143000" indent="-228600" algn="l" defTabSz="914400" rtl="0" eaLnBrk="1" latinLnBrk="0" hangingPunct="1">
+              <a:spcBef>
+                <a:spcPct val="20000"/>
+              </a:spcBef>
+              <a:buClr>
+                <a:srgbClr val="4E84C4"/>
+              </a:buClr>
+              <a:buFont typeface="Courier New" pitchFamily="49" charset="0"/>
+              <a:buChar char="o"/>
+              <a:defRPr sz="1800" kern="1200">
+                <a:solidFill>
+                  <a:schemeClr val="tx1"/>
+                </a:solidFill>
+                <a:latin typeface="Myriad Pro" pitchFamily="34" charset="0"/>
+                <a:ea typeface="+mn-ea"/>
+                <a:cs typeface="+mn-cs"/>
+              </a:defRPr>
+            </a:lvl3pPr>
+            <a:lvl4pPr marL="1600200" indent="-228600" algn="l" defTabSz="914400" rtl="0" eaLnBrk="1" latinLnBrk="0" hangingPunct="1">
+              <a:spcBef>
+                <a:spcPct val="20000"/>
+              </a:spcBef>
+              <a:buClr>
+                <a:srgbClr val="4E84C4"/>
+              </a:buClr>
+              <a:buFont typeface="Arial" pitchFamily="34" charset="0"/>
+              <a:buChar char="•"/>
+              <a:defRPr sz="1600" kern="1200">
+                <a:solidFill>
+                  <a:schemeClr val="tx1"/>
+                </a:solidFill>
+                <a:latin typeface="Myriad Pro" pitchFamily="34" charset="0"/>
+                <a:ea typeface="+mn-ea"/>
+                <a:cs typeface="+mn-cs"/>
+              </a:defRPr>
+            </a:lvl4pPr>
+            <a:lvl5pPr marL="2057400" indent="-228600" algn="l" defTabSz="914400" rtl="0" eaLnBrk="1" latinLnBrk="0" hangingPunct="1">
+              <a:spcBef>
+                <a:spcPct val="20000"/>
+              </a:spcBef>
+              <a:buFont typeface="Arial" pitchFamily="34" charset="0"/>
+              <a:buChar char="»"/>
+              <a:defRPr sz="2000" kern="1200">
+                <a:solidFill>
+                  <a:schemeClr val="tx1"/>
+                </a:solidFill>
+                <a:latin typeface="Myriad Pro" pitchFamily="34" charset="0"/>
+                <a:ea typeface="+mn-ea"/>
+                <a:cs typeface="+mn-cs"/>
+              </a:defRPr>
+            </a:lvl5pPr>
+            <a:lvl6pPr marL="2514600" indent="-228600" algn="l" defTabSz="914400" rtl="0" eaLnBrk="1" latinLnBrk="0" hangingPunct="1">
+              <a:spcBef>
+                <a:spcPct val="20000"/>
+              </a:spcBef>
+              <a:buFont typeface="Arial" pitchFamily="34" charset="0"/>
+              <a:buChar char="•"/>
+              <a:defRPr sz="2000" kern="1200">
+                <a:solidFill>
+                  <a:schemeClr val="tx1"/>
+                </a:solidFill>
+                <a:latin typeface="+mn-lt"/>
+                <a:ea typeface="+mn-ea"/>
+                <a:cs typeface="+mn-cs"/>
+              </a:defRPr>
+            </a:lvl6pPr>
+            <a:lvl7pPr marL="2971800" indent="-228600" algn="l" defTabSz="914400" rtl="0" eaLnBrk="1" latinLnBrk="0" hangingPunct="1">
+              <a:spcBef>
+                <a:spcPct val="20000"/>
+              </a:spcBef>
+              <a:buFont typeface="Arial" pitchFamily="34" charset="0"/>
+              <a:buChar char="•"/>
+              <a:defRPr sz="2000" kern="1200">
+                <a:solidFill>
+                  <a:schemeClr val="tx1"/>
+                </a:solidFill>
+                <a:latin typeface="+mn-lt"/>
+                <a:ea typeface="+mn-ea"/>
+                <a:cs typeface="+mn-cs"/>
+              </a:defRPr>
+            </a:lvl7pPr>
+            <a:lvl8pPr marL="3429000" indent="-228600" algn="l" defTabSz="914400" rtl="0" eaLnBrk="1" latinLnBrk="0" hangingPunct="1">
+              <a:spcBef>
+                <a:spcPct val="20000"/>
+              </a:spcBef>
+              <a:buFont typeface="Arial" pitchFamily="34" charset="0"/>
+              <a:buChar char="•"/>
+              <a:defRPr sz="2000" kern="1200">
+                <a:solidFill>
+                  <a:schemeClr val="tx1"/>
+                </a:solidFill>
+                <a:latin typeface="+mn-lt"/>
+                <a:ea typeface="+mn-ea"/>
+                <a:cs typeface="+mn-cs"/>
+              </a:defRPr>
+            </a:lvl8pPr>
+            <a:lvl9pPr marL="3886200" indent="-228600" algn="l" defTabSz="914400" rtl="0" eaLnBrk="1" latinLnBrk="0" hangingPunct="1">
+              <a:spcBef>
+                <a:spcPct val="20000"/>
+              </a:spcBef>
+              <a:buFont typeface="Arial" pitchFamily="34" charset="0"/>
+              <a:buChar char="•"/>
+              <a:defRPr sz="2000" kern="1200">
+                <a:solidFill>
+                  <a:schemeClr val="tx1"/>
+                </a:solidFill>
+                <a:latin typeface="+mn-lt"/>
+                <a:ea typeface="+mn-ea"/>
+                <a:cs typeface="+mn-cs"/>
+              </a:defRPr>
+            </a:lvl9pPr>
+          </a:lstStyle>
+          <a:p>
+            <a:pPr marL="177800" indent="-177800" fontAlgn="base">
+              <a:spcAft>
+                <a:spcPct val="0"/>
+              </a:spcAft>
+            </a:pPr>
+            <a:r>
+              <a:rPr lang="en-US" sz="1400" dirty="0">
+                <a:solidFill>
+                  <a:srgbClr val="000000"/>
+                </a:solidFill>
+                <a:latin typeface="Arial" panose="020B0604020202020204" pitchFamily="34" charset="0"/>
+                <a:cs typeface="Arial" pitchFamily="34" charset="0"/>
+              </a:rPr>
+              <a:t>Sentiment Analysis using Natural Language Took Kit (NLTK) and </a:t>
+            </a:r>
+            <a:r>
+              <a:rPr lang="en-US" sz="1400" dirty="0" err="1">
+                <a:solidFill>
+                  <a:srgbClr val="000000"/>
+                </a:solidFill>
+                <a:latin typeface="Arial" panose="020B0604020202020204" pitchFamily="34" charset="0"/>
+                <a:cs typeface="Arial" pitchFamily="34" charset="0"/>
+              </a:rPr>
+              <a:t>TextBlob</a:t>
+            </a:r>
+            <a:endParaRPr lang="en-US" sz="1400" dirty="0">
+              <a:solidFill>
+                <a:srgbClr val="000000"/>
+              </a:solidFill>
+              <a:latin typeface="Arial" panose="020B0604020202020204" pitchFamily="34" charset="0"/>
+              <a:cs typeface="Arial" pitchFamily="34" charset="0"/>
+            </a:endParaRPr>
+          </a:p>
+          <a:p>
+            <a:pPr marL="177800" indent="-177800" fontAlgn="base">
+              <a:spcAft>
+                <a:spcPct val="0"/>
+              </a:spcAft>
+            </a:pPr>
+            <a:r>
+              <a:rPr lang="en-US" sz="1400" dirty="0">
+                <a:solidFill>
+                  <a:srgbClr val="000000"/>
+                </a:solidFill>
+                <a:latin typeface="Arial" panose="020B0604020202020204" pitchFamily="34" charset="0"/>
+                <a:cs typeface="Arial" pitchFamily="34" charset="0"/>
+              </a:rPr>
+              <a:t>Price Prediction</a:t>
+            </a:r>
+          </a:p>
+          <a:p>
+            <a:pPr marL="177800" indent="-177800" fontAlgn="base">
+              <a:spcAft>
+                <a:spcPct val="0"/>
+              </a:spcAft>
+            </a:pPr>
+            <a:r>
+              <a:rPr lang="en-US" sz="1400" dirty="0">
+                <a:solidFill>
+                  <a:srgbClr val="000000"/>
+                </a:solidFill>
+                <a:latin typeface="Arial" panose="020B0604020202020204" pitchFamily="34" charset="0"/>
+                <a:cs typeface="Arial" pitchFamily="34" charset="0"/>
+              </a:rPr>
+              <a:t>Finding out what makes a property successful, e.g. which amenities are most important, and what other factors decide success</a:t>
+            </a:r>
+          </a:p>
+          <a:p>
+            <a:pPr marL="177800" indent="-177800" fontAlgn="base">
+              <a:spcAft>
+                <a:spcPct val="0"/>
+              </a:spcAft>
+            </a:pPr>
+            <a:r>
+              <a:rPr lang="en-US" sz="1400" dirty="0">
+                <a:solidFill>
+                  <a:srgbClr val="000000"/>
+                </a:solidFill>
+                <a:latin typeface="Arial" panose="020B0604020202020204" pitchFamily="34" charset="0"/>
+                <a:cs typeface="Arial" pitchFamily="34" charset="0"/>
+              </a:rPr>
+              <a:t>Help in deciding in which locations to invest for starting an Airbnb business</a:t>
+            </a:r>
+          </a:p>
+          <a:p>
+            <a:pPr marL="177800" indent="-177800" fontAlgn="base">
+              <a:spcAft>
+                <a:spcPct val="0"/>
+              </a:spcAft>
+            </a:pPr>
+            <a:endParaRPr lang="en-US" sz="1400" dirty="0">
+              <a:solidFill>
+                <a:srgbClr val="000000"/>
+              </a:solidFill>
+              <a:latin typeface="Arial" panose="020B0604020202020204" pitchFamily="34" charset="0"/>
+              <a:cs typeface="Arial" pitchFamily="34" charset="0"/>
+            </a:endParaRPr>
+          </a:p>
+          <a:p>
+            <a:pPr marL="0" indent="0" fontAlgn="base">
+              <a:spcAft>
+                <a:spcPct val="0"/>
+              </a:spcAft>
+              <a:buNone/>
+            </a:pPr>
+            <a:endParaRPr lang="en-US" sz="1400" dirty="0">
+              <a:solidFill>
+                <a:srgbClr val="000000"/>
+              </a:solidFill>
+              <a:latin typeface="Arial" panose="020B0604020202020204" pitchFamily="34" charset="0"/>
+              <a:cs typeface="Arial" pitchFamily="34" charset="0"/>
+            </a:endParaRPr>
+          </a:p>
+        </p:txBody>
+      </p:sp>
+    </p:spTree>
+    <p:extLst>
+      <p:ext uri="{BB962C8B-B14F-4D97-AF65-F5344CB8AC3E}">
+        <p14:creationId xmlns:p14="http://schemas.microsoft.com/office/powerpoint/2010/main" val="2711399644"/>
+      </p:ext>
+    </p:extLst>
+  </p:cSld>
+  <p:clrMapOvr>
+    <a:masterClrMapping/>
+  </p:clrMapOvr>
+</p:sld>
+</file>
+
+<file path=ppt/slides/slide13.xml><?xml version="1.0" encoding="utf-8"?>
+<p:sld xmlns:a="http://schemas.openxmlformats.org/drawingml/2006/main" xmlns:r="http://schemas.openxmlformats.org/officeDocument/2006/relationships" xmlns:p="http://schemas.openxmlformats.org/presentationml/2006/main">
+  <p:cSld>
+    <p:spTree>
+      <p:nvGrpSpPr>
+        <p:cNvPr id="1" name=""/>
+        <p:cNvGrpSpPr/>
+        <p:nvPr/>
+      </p:nvGrpSpPr>
+      <p:grpSpPr>
+        <a:xfrm>
+          <a:off x="0" y="0"/>
+          <a:ext cx="0" cy="0"/>
+          <a:chOff x="0" y="0"/>
+          <a:chExt cx="0" cy="0"/>
+        </a:xfrm>
+      </p:grpSpPr>
+      <p:sp>
+        <p:nvSpPr>
+          <p:cNvPr id="4" name="Title 1">
+            <a:extLst>
+              <a:ext uri="{FF2B5EF4-FFF2-40B4-BE49-F238E27FC236}">
+                <a16:creationId xmlns:a16="http://schemas.microsoft.com/office/drawing/2014/main" id="{BDCF3F0B-BAA3-40A9-AF80-8D2C1E53A973}"/>
+              </a:ext>
+            </a:extLst>
+          </p:cNvPr>
+          <p:cNvSpPr>
+            <a:spLocks noGrp="1"/>
+          </p:cNvSpPr>
+          <p:nvPr>
+            <p:ph type="ctrTitle"/>
+          </p:nvPr>
+        </p:nvSpPr>
+        <p:spPr>
+          <a:xfrm>
+            <a:off x="684212" y="685799"/>
+            <a:ext cx="8001000" cy="2971801"/>
+          </a:xfrm>
+        </p:spPr>
+        <p:txBody>
+          <a:bodyPr>
+            <a:normAutofit/>
+          </a:bodyPr>
+          <a:lstStyle/>
+          <a:p>
+            <a:r>
+              <a:rPr lang="en-US" sz="2800" cap="none" dirty="0"/>
+              <a:t>Thank You</a:t>
+            </a:r>
+            <a:endParaRPr lang="en-CA" sz="2800" cap="none" dirty="0">
+              <a:latin typeface="Arial" panose="020B0604020202020204" pitchFamily="34" charset="0"/>
+              <a:cs typeface="Arial" panose="020B0604020202020204" pitchFamily="34" charset="0"/>
+            </a:endParaRPr>
+          </a:p>
+        </p:txBody>
+      </p:sp>
+    </p:spTree>
+    <p:extLst>
+      <p:ext uri="{BB962C8B-B14F-4D97-AF65-F5344CB8AC3E}">
+        <p14:creationId xmlns:p14="http://schemas.microsoft.com/office/powerpoint/2010/main" val="2123374670"/>
+      </p:ext>
+    </p:extLst>
+  </p:cSld>
+  <p:clrMapOvr>
+    <a:masterClrMapping/>
+  </p:clrMapOvr>
+</p:sld>
+</file>
+
+<file path=ppt/slides/slide2.xml><?xml version="1.0" encoding="utf-8"?>
+<p:sld xmlns:a="http://schemas.openxmlformats.org/drawingml/2006/main" xmlns:r="http://schemas.openxmlformats.org/officeDocument/2006/relationships" xmlns:p="http://schemas.openxmlformats.org/presentationml/2006/main">
+  <p:cSld>
+    <p:spTree>
+      <p:nvGrpSpPr>
+        <p:cNvPr id="1" name=""/>
+        <p:cNvGrpSpPr/>
+        <p:nvPr/>
+      </p:nvGrpSpPr>
+      <p:grpSpPr>
+        <a:xfrm>
+          <a:off x="0" y="0"/>
+          <a:ext cx="0" cy="0"/>
+          <a:chOff x="0" y="0"/>
+          <a:chExt cx="0" cy="0"/>
+        </a:xfrm>
+      </p:grpSpPr>
+      <p:sp>
+        <p:nvSpPr>
+          <p:cNvPr id="5" name="Title 1">
+            <a:extLst>
+              <a:ext uri="{FF2B5EF4-FFF2-40B4-BE49-F238E27FC236}">
+                <a16:creationId xmlns:a16="http://schemas.microsoft.com/office/drawing/2014/main" id="{02FB3FF4-C4B1-4F6B-BD55-EC26D607F64C}"/>
+              </a:ext>
+            </a:extLst>
+          </p:cNvPr>
+          <p:cNvSpPr txBox="1">
+            <a:spLocks/>
+          </p:cNvSpPr>
+          <p:nvPr/>
+        </p:nvSpPr>
+        <p:spPr bwMode="auto">
+          <a:xfrm>
+            <a:off x="1727200" y="274320"/>
+            <a:ext cx="10058400" cy="487363"/>
+          </a:xfrm>
+          <a:prstGeom prst="rect">
+            <a:avLst/>
+          </a:prstGeom>
+          <a:noFill/>
+          <a:ln>
+            <a:noFill/>
+          </a:ln>
+          <a:extLst>
+            <a:ext uri="{909E8E84-426E-40DD-AFC4-6F175D3DCCD1}">
+              <a14:hiddenFill xmlns:a14="http://schemas.microsoft.com/office/drawing/2010/main">
+                <a:solidFill>
+                  <a:srgbClr val="FFFFFF"/>
+                </a:solidFill>
+              </a14:hiddenFill>
+            </a:ext>
+            <a:ext uri="{91240B29-F687-4F45-9708-019B960494DF}">
+              <a14:hiddenLine xmlns:a14="http://schemas.microsoft.com/office/drawing/2010/main" w="9525">
+                <a:solidFill>
+                  <a:srgbClr val="000000"/>
+                </a:solidFill>
+                <a:miter lim="800000"/>
+                <a:headEnd/>
+                <a:tailEnd/>
+              </a14:hiddenLine>
+            </a:ext>
+          </a:extLst>
+        </p:spPr>
+        <p:txBody>
+          <a:bodyPr vert="horz" wrap="square" lIns="121899" tIns="60949" rIns="121899" bIns="60949" numCol="1" anchor="ctr" anchorCtr="0" compatLnSpc="1">
+            <a:prstTxWarp prst="textNoShape">
+              <a:avLst/>
+            </a:prstTxWarp>
+            <a:noAutofit/>
+          </a:bodyPr>
+          <a:lstStyle>
+            <a:lvl1pPr algn="l" rtl="0" eaLnBrk="1" fontAlgn="base" hangingPunct="1">
+              <a:spcBef>
+                <a:spcPct val="0"/>
+              </a:spcBef>
+              <a:spcAft>
+                <a:spcPct val="0"/>
+              </a:spcAft>
+              <a:defRPr sz="2200" kern="1200">
+                <a:solidFill>
+                  <a:schemeClr val="bg1"/>
+                </a:solidFill>
+                <a:latin typeface="Arial" pitchFamily="34" charset="0"/>
+                <a:ea typeface="+mj-ea"/>
+                <a:cs typeface="Arial" pitchFamily="34" charset="0"/>
+              </a:defRPr>
+            </a:lvl1pPr>
+            <a:lvl2pPr algn="l" rtl="0" eaLnBrk="1" fontAlgn="base" hangingPunct="1">
+              <a:spcBef>
+                <a:spcPct val="0"/>
+              </a:spcBef>
+              <a:spcAft>
+                <a:spcPct val="0"/>
+              </a:spcAft>
+              <a:defRPr sz="2900">
+                <a:solidFill>
+                  <a:schemeClr val="bg1"/>
+                </a:solidFill>
+                <a:latin typeface="Arial" pitchFamily="34" charset="0"/>
+                <a:cs typeface="Arial" pitchFamily="34" charset="0"/>
+              </a:defRPr>
+            </a:lvl2pPr>
+            <a:lvl3pPr algn="l" rtl="0" eaLnBrk="1" fontAlgn="base" hangingPunct="1">
+              <a:spcBef>
+                <a:spcPct val="0"/>
+              </a:spcBef>
+              <a:spcAft>
+                <a:spcPct val="0"/>
+              </a:spcAft>
+              <a:defRPr sz="2900">
+                <a:solidFill>
+                  <a:schemeClr val="bg1"/>
+                </a:solidFill>
+                <a:latin typeface="Arial" pitchFamily="34" charset="0"/>
+                <a:cs typeface="Arial" pitchFamily="34" charset="0"/>
+              </a:defRPr>
+            </a:lvl3pPr>
+            <a:lvl4pPr algn="l" rtl="0" eaLnBrk="1" fontAlgn="base" hangingPunct="1">
+              <a:spcBef>
+                <a:spcPct val="0"/>
+              </a:spcBef>
+              <a:spcAft>
+                <a:spcPct val="0"/>
+              </a:spcAft>
+              <a:defRPr sz="2900">
+                <a:solidFill>
+                  <a:schemeClr val="bg1"/>
+                </a:solidFill>
+                <a:latin typeface="Arial" pitchFamily="34" charset="0"/>
+                <a:cs typeface="Arial" pitchFamily="34" charset="0"/>
+              </a:defRPr>
+            </a:lvl4pPr>
+            <a:lvl5pPr algn="l" rtl="0" eaLnBrk="1" fontAlgn="base" hangingPunct="1">
+              <a:spcBef>
+                <a:spcPct val="0"/>
+              </a:spcBef>
+              <a:spcAft>
+                <a:spcPct val="0"/>
+              </a:spcAft>
+              <a:defRPr sz="2900">
+                <a:solidFill>
+                  <a:schemeClr val="bg1"/>
+                </a:solidFill>
+                <a:latin typeface="Arial" pitchFamily="34" charset="0"/>
+                <a:cs typeface="Arial" pitchFamily="34" charset="0"/>
+              </a:defRPr>
+            </a:lvl5pPr>
+            <a:lvl6pPr marL="609493" algn="l" rtl="0" eaLnBrk="1" fontAlgn="base" hangingPunct="1">
+              <a:spcBef>
+                <a:spcPct val="0"/>
+              </a:spcBef>
+              <a:spcAft>
+                <a:spcPct val="0"/>
+              </a:spcAft>
+              <a:defRPr sz="3700">
+                <a:solidFill>
+                  <a:schemeClr val="bg1"/>
+                </a:solidFill>
+                <a:latin typeface="Arial" pitchFamily="34" charset="0"/>
+                <a:cs typeface="Arial" pitchFamily="34" charset="0"/>
+              </a:defRPr>
+            </a:lvl6pPr>
+            <a:lvl7pPr marL="1218987" algn="l" rtl="0" eaLnBrk="1" fontAlgn="base" hangingPunct="1">
+              <a:spcBef>
+                <a:spcPct val="0"/>
+              </a:spcBef>
+              <a:spcAft>
+                <a:spcPct val="0"/>
+              </a:spcAft>
+              <a:defRPr sz="3700">
+                <a:solidFill>
+                  <a:schemeClr val="bg1"/>
+                </a:solidFill>
+                <a:latin typeface="Arial" pitchFamily="34" charset="0"/>
+                <a:cs typeface="Arial" pitchFamily="34" charset="0"/>
+              </a:defRPr>
+            </a:lvl7pPr>
+            <a:lvl8pPr marL="1828480" algn="l" rtl="0" eaLnBrk="1" fontAlgn="base" hangingPunct="1">
+              <a:spcBef>
+                <a:spcPct val="0"/>
+              </a:spcBef>
+              <a:spcAft>
+                <a:spcPct val="0"/>
+              </a:spcAft>
+              <a:defRPr sz="3700">
+                <a:solidFill>
+                  <a:schemeClr val="bg1"/>
+                </a:solidFill>
+                <a:latin typeface="Arial" pitchFamily="34" charset="0"/>
+                <a:cs typeface="Arial" pitchFamily="34" charset="0"/>
+              </a:defRPr>
+            </a:lvl8pPr>
+            <a:lvl9pPr marL="2437973" algn="l" rtl="0" eaLnBrk="1" fontAlgn="base" hangingPunct="1">
+              <a:spcBef>
+                <a:spcPct val="0"/>
+              </a:spcBef>
+              <a:spcAft>
+                <a:spcPct val="0"/>
+              </a:spcAft>
+              <a:defRPr sz="3700">
+                <a:solidFill>
+                  <a:schemeClr val="bg1"/>
+                </a:solidFill>
+                <a:latin typeface="Arial" pitchFamily="34" charset="0"/>
+                <a:cs typeface="Arial" pitchFamily="34" charset="0"/>
+              </a:defRPr>
+            </a:lvl9pPr>
+          </a:lstStyle>
+          <a:p>
+            <a:pPr lvl="0" defTabSz="914400"/>
+            <a:r>
+              <a:rPr lang="en-US" sz="2400" b="1" dirty="0">
+                <a:solidFill>
+                  <a:sysClr val="window" lastClr="FFFFFF"/>
+                </a:solidFill>
+              </a:rPr>
+              <a:t>Airbnb Toronto Data Analysis</a:t>
+            </a:r>
+            <a:br>
+              <a:rPr kumimoji="0" lang="en-US" sz="2400" b="0" i="0" u="none" strike="noStrike" kern="1200" cap="none" spc="0" normalizeH="0" baseline="0" noProof="0" dirty="0">
+                <a:ln>
+                  <a:noFill/>
+                </a:ln>
+                <a:solidFill>
+                  <a:sysClr val="window" lastClr="FFFFFF"/>
+                </a:solidFill>
+                <a:effectLst/>
+                <a:uLnTx/>
+                <a:uFillTx/>
+                <a:latin typeface="Arial" pitchFamily="34" charset="0"/>
+                <a:ea typeface="+mj-ea"/>
+                <a:cs typeface="Arial" pitchFamily="34" charset="0"/>
+              </a:rPr>
+            </a:br>
+            <a:r>
+              <a:rPr lang="en-GB" sz="2400" dirty="0">
+                <a:solidFill>
+                  <a:srgbClr val="FFDD3E"/>
+                </a:solidFill>
+              </a:rPr>
+              <a:t>Correlation Matrix – All</a:t>
+            </a:r>
+            <a:r>
+              <a:rPr kumimoji="0" lang="en-GB" sz="2400" b="0" i="0" u="none" strike="noStrike" kern="1200" cap="none" spc="0" normalizeH="0" baseline="0" noProof="0" dirty="0">
+                <a:ln>
+                  <a:noFill/>
+                </a:ln>
+                <a:solidFill>
+                  <a:srgbClr val="FFDD3E"/>
+                </a:solidFill>
+                <a:effectLst/>
+                <a:uLnTx/>
+                <a:uFillTx/>
+                <a:latin typeface="Arial" pitchFamily="34" charset="0"/>
+                <a:ea typeface="+mj-ea"/>
+                <a:cs typeface="Arial" pitchFamily="34" charset="0"/>
+              </a:rPr>
+              <a:t> Attributes</a:t>
+            </a:r>
+            <a:endParaRPr kumimoji="0" lang="en-GB" sz="2200" b="0" i="0" u="none" strike="noStrike" kern="1200" cap="none" spc="0" normalizeH="0" baseline="0" noProof="0" dirty="0">
+              <a:ln>
+                <a:noFill/>
+              </a:ln>
+              <a:solidFill>
+                <a:srgbClr val="FFDD3E"/>
+              </a:solidFill>
+              <a:effectLst/>
+              <a:uLnTx/>
+              <a:uFillTx/>
+              <a:latin typeface="Arial" pitchFamily="34" charset="0"/>
+              <a:ea typeface="+mj-ea"/>
+              <a:cs typeface="Arial" pitchFamily="34" charset="0"/>
+            </a:endParaRPr>
+          </a:p>
+        </p:txBody>
+      </p:sp>
+      <p:sp>
+        <p:nvSpPr>
+          <p:cNvPr id="6" name="Rectangle 5">
+            <a:extLst>
+              <a:ext uri="{FF2B5EF4-FFF2-40B4-BE49-F238E27FC236}">
+                <a16:creationId xmlns:a16="http://schemas.microsoft.com/office/drawing/2014/main" id="{8E48BA95-CB03-4C0F-BD3B-653DBB7534FE}"/>
+              </a:ext>
+            </a:extLst>
+          </p:cNvPr>
+          <p:cNvSpPr/>
+          <p:nvPr/>
+        </p:nvSpPr>
+        <p:spPr>
+          <a:xfrm>
+            <a:off x="0" y="1039511"/>
+            <a:ext cx="12192000" cy="5228948"/>
+          </a:xfrm>
+          <a:prstGeom prst="rect">
+            <a:avLst/>
+          </a:prstGeom>
+          <a:gradFill flip="none" rotWithShape="1">
+            <a:gsLst>
+              <a:gs pos="0">
+                <a:schemeClr val="tx1">
+                  <a:shade val="30000"/>
+                  <a:satMod val="115000"/>
+                </a:schemeClr>
+              </a:gs>
+              <a:gs pos="50000">
+                <a:schemeClr val="tx1">
+                  <a:shade val="67500"/>
+                  <a:satMod val="115000"/>
+                </a:schemeClr>
+              </a:gs>
+              <a:gs pos="100000">
+                <a:schemeClr val="tx1">
+                  <a:shade val="100000"/>
+                  <a:satMod val="115000"/>
+                </a:schemeClr>
+              </a:gs>
+            </a:gsLst>
+            <a:lin ang="13500000" scaled="1"/>
+            <a:tileRect/>
+          </a:gradFill>
+          <a:ln>
+            <a:noFill/>
+          </a:ln>
+        </p:spPr>
+        <p:style>
+          <a:lnRef idx="2">
+            <a:schemeClr val="accent1">
+              <a:shade val="50000"/>
+            </a:schemeClr>
+          </a:lnRef>
+          <a:fillRef idx="1">
+            <a:schemeClr val="accent1"/>
+          </a:fillRef>
+          <a:effectRef idx="0">
+            <a:schemeClr val="accent1"/>
+          </a:effectRef>
+          <a:fontRef idx="minor">
+            <a:schemeClr val="lt1"/>
+          </a:fontRef>
+        </p:style>
+        <p:txBody>
+          <a:bodyPr rtlCol="0" anchor="ctr"/>
+          <a:lstStyle/>
+          <a:p>
+            <a:pPr algn="ctr"/>
+            <a:endParaRPr lang="en-CA"/>
+          </a:p>
+        </p:txBody>
+      </p:sp>
+      <p:sp>
+        <p:nvSpPr>
+          <p:cNvPr id="14" name="Footer Placeholder 13">
+            <a:extLst>
+              <a:ext uri="{FF2B5EF4-FFF2-40B4-BE49-F238E27FC236}">
+                <a16:creationId xmlns:a16="http://schemas.microsoft.com/office/drawing/2014/main" id="{ADDA3989-0382-4CE8-8B5E-5C4C5EE60396}"/>
+              </a:ext>
+            </a:extLst>
+          </p:cNvPr>
+          <p:cNvSpPr>
+            <a:spLocks noGrp="1"/>
+          </p:cNvSpPr>
+          <p:nvPr>
+            <p:ph type="ftr" sz="quarter" idx="11"/>
+          </p:nvPr>
+        </p:nvSpPr>
+        <p:spPr/>
+        <p:txBody>
+          <a:bodyPr/>
+          <a:lstStyle/>
+          <a:p>
+            <a:r>
+              <a:rPr lang="en-US" dirty="0"/>
+              <a:t>Airbnb Toronto Data Analysis</a:t>
             </a:r>
           </a:p>
         </p:txBody>
@@ -6894,12 +8506,8 @@
           <a:lstStyle/>
           <a:p>
             <a:r>
-              <a:rPr lang="en-US" dirty="0" err="1"/>
-              <a:t>AirBnB</a:t>
-            </a:r>
-            <a:r>
               <a:rPr lang="en-US" dirty="0"/>
-              <a:t> Toronto Data Analysis</a:t>
+              <a:t>Airbnb Toronto Data Analysis</a:t>
             </a:r>
           </a:p>
         </p:txBody>
@@ -7158,20 +8766,12 @@
           <a:p>
             <a:pPr lvl="0" defTabSz="914400"/>
             <a:r>
-              <a:rPr lang="en-US" sz="2400" b="1" dirty="0" err="1">
+              <a:rPr lang="en-US" sz="2400" b="1" dirty="0">
                 <a:solidFill>
                   <a:sysClr val="window" lastClr="FFFFFF"/>
                 </a:solidFill>
               </a:rPr>
-              <a:t>AirBnB</a:t>
-            </a:r>
-            <a:r>
-              <a:rPr lang="en-US" sz="2400" b="1" dirty="0">
-                <a:solidFill>
-                  <a:sysClr val="window" lastClr="FFFFFF"/>
-                </a:solidFill>
-              </a:rPr>
-              <a:t> Toronto Data Analysis</a:t>
+              <a:t>Airbnb Toronto Data Analysis</a:t>
             </a:r>
             <a:br>
               <a:rPr kumimoji="0" lang="en-US" sz="2400" b="0" i="0" u="none" strike="noStrike" kern="1200" cap="none" spc="0" normalizeH="0" baseline="0" noProof="0" dirty="0">
@@ -7356,12 +8956,8 @@
           <a:lstStyle/>
           <a:p>
             <a:r>
-              <a:rPr lang="en-US" dirty="0" err="1"/>
-              <a:t>AirBnB</a:t>
-            </a:r>
-            <a:r>
               <a:rPr lang="en-US" dirty="0"/>
-              <a:t> Toronto Data Analysis</a:t>
+              <a:t>Airbnb Toronto Data Analysis</a:t>
             </a:r>
           </a:p>
         </p:txBody>
@@ -7650,20 +9246,12 @@
           <a:p>
             <a:pPr lvl="0" defTabSz="914400"/>
             <a:r>
-              <a:rPr lang="en-US" sz="2400" b="1" dirty="0" err="1">
+              <a:rPr lang="en-US" sz="2400" b="1" dirty="0">
                 <a:solidFill>
                   <a:sysClr val="window" lastClr="FFFFFF"/>
                 </a:solidFill>
               </a:rPr>
-              <a:t>AirBnB</a:t>
-            </a:r>
-            <a:r>
-              <a:rPr lang="en-US" sz="2400" b="1" dirty="0">
-                <a:solidFill>
-                  <a:sysClr val="window" lastClr="FFFFFF"/>
-                </a:solidFill>
-              </a:rPr>
-              <a:t> Toronto Data Analysis</a:t>
+              <a:t>Airbnb Toronto Data Analysis</a:t>
             </a:r>
             <a:br>
               <a:rPr kumimoji="0" lang="en-US" sz="2400" b="0" i="0" u="none" strike="noStrike" kern="1200" cap="none" spc="0" normalizeH="0" baseline="0" noProof="0" dirty="0">
@@ -7831,12 +9419,8 @@
           <a:lstStyle/>
           <a:p>
             <a:r>
-              <a:rPr lang="en-US" dirty="0" err="1"/>
-              <a:t>AirBnB</a:t>
-            </a:r>
-            <a:r>
               <a:rPr lang="en-US" dirty="0"/>
-              <a:t> Toronto Data Analysis</a:t>
+              <a:t>Airbnb Toronto Data Analysis</a:t>
             </a:r>
           </a:p>
         </p:txBody>
@@ -8065,20 +9649,12 @@
           <a:p>
             <a:pPr lvl="0" defTabSz="914400"/>
             <a:r>
-              <a:rPr lang="en-US" sz="2400" b="1" dirty="0" err="1">
+              <a:rPr lang="en-US" sz="2400" b="1" dirty="0">
                 <a:solidFill>
                   <a:sysClr val="window" lastClr="FFFFFF"/>
                 </a:solidFill>
               </a:rPr>
-              <a:t>AirBnB</a:t>
-            </a:r>
-            <a:r>
-              <a:rPr lang="en-US" sz="2400" b="1" dirty="0">
-                <a:solidFill>
-                  <a:sysClr val="window" lastClr="FFFFFF"/>
-                </a:solidFill>
-              </a:rPr>
-              <a:t> Toronto Data Analysis</a:t>
+              <a:t>Airbnb Toronto Data Analysis</a:t>
             </a:r>
             <a:br>
               <a:rPr kumimoji="0" lang="en-US" sz="2400" b="0" i="0" u="none" strike="noStrike" kern="1200" cap="none" spc="0" normalizeH="0" baseline="0" noProof="0" dirty="0">
@@ -8144,7 +9720,7 @@
         <p:spPr>
           <a:xfrm>
             <a:off x="729027" y="1133475"/>
-            <a:ext cx="10733945" cy="5228948"/>
+            <a:ext cx="10733945" cy="5091477"/>
           </a:xfrm>
           <a:prstGeom prst="rect">
             <a:avLst/>
@@ -8276,12 +9852,8 @@
           <a:lstStyle/>
           <a:p>
             <a:r>
-              <a:rPr lang="en-US" dirty="0" err="1"/>
-              <a:t>AirBnB</a:t>
-            </a:r>
-            <a:r>
               <a:rPr lang="en-US" dirty="0"/>
-              <a:t> Toronto Data Analysis</a:t>
+              <a:t>Airbnb Toronto Data Analysis</a:t>
             </a:r>
           </a:p>
         </p:txBody>
@@ -8570,20 +10142,12 @@
           <a:p>
             <a:pPr lvl="0" defTabSz="914400"/>
             <a:r>
-              <a:rPr lang="en-US" sz="2400" b="1" dirty="0" err="1">
+              <a:rPr lang="en-US" sz="2400" b="1" dirty="0">
                 <a:solidFill>
                   <a:sysClr val="window" lastClr="FFFFFF"/>
                 </a:solidFill>
               </a:rPr>
-              <a:t>AirBnB</a:t>
-            </a:r>
-            <a:r>
-              <a:rPr lang="en-US" sz="2400" b="1" dirty="0">
-                <a:solidFill>
-                  <a:sysClr val="window" lastClr="FFFFFF"/>
-                </a:solidFill>
-              </a:rPr>
-              <a:t> Toronto Data Analysis</a:t>
+              <a:t>Airbnb Toronto Data Analysis</a:t>
             </a:r>
             <a:br>
               <a:rPr kumimoji="0" lang="en-US" sz="2400" b="0" i="0" u="none" strike="noStrike" kern="1200" cap="none" spc="0" normalizeH="0" baseline="0" noProof="0" dirty="0">
@@ -8751,12 +10315,8 @@
           <a:lstStyle/>
           <a:p>
             <a:r>
-              <a:rPr lang="en-US" dirty="0" err="1"/>
-              <a:t>AirBnB</a:t>
-            </a:r>
-            <a:r>
               <a:rPr lang="en-US" dirty="0"/>
-              <a:t> Toronto Data Analysis</a:t>
+              <a:t>Airbnb Toronto Data Analysis</a:t>
             </a:r>
           </a:p>
         </p:txBody>
@@ -9015,20 +10575,12 @@
           <a:p>
             <a:pPr lvl="0" defTabSz="914400"/>
             <a:r>
-              <a:rPr lang="en-US" sz="2400" b="1" dirty="0" err="1">
+              <a:rPr lang="en-US" sz="2400" b="1" dirty="0">
                 <a:solidFill>
                   <a:sysClr val="window" lastClr="FFFFFF"/>
                 </a:solidFill>
               </a:rPr>
-              <a:t>AirBnB</a:t>
-            </a:r>
-            <a:r>
-              <a:rPr lang="en-US" sz="2400" b="1" dirty="0">
-                <a:solidFill>
-                  <a:sysClr val="window" lastClr="FFFFFF"/>
-                </a:solidFill>
-              </a:rPr>
-              <a:t> Toronto Data Analysis</a:t>
+              <a:t>Airbnb Toronto Data Analysis</a:t>
             </a:r>
             <a:br>
               <a:rPr kumimoji="0" lang="en-US" sz="2400" b="0" i="0" u="none" strike="noStrike" kern="1200" cap="none" spc="0" normalizeH="0" baseline="0" noProof="0" dirty="0">
@@ -9196,12 +10748,8 @@
           <a:lstStyle/>
           <a:p>
             <a:r>
-              <a:rPr lang="en-US" dirty="0" err="1"/>
-              <a:t>AirBnB</a:t>
-            </a:r>
-            <a:r>
               <a:rPr lang="en-US" dirty="0"/>
-              <a:t> Toronto Data Analysis</a:t>
+              <a:t>Airbnb Toronto Data Analysis</a:t>
             </a:r>
           </a:p>
         </p:txBody>
@@ -9460,20 +11008,12 @@
           <a:p>
             <a:pPr lvl="0" defTabSz="914400"/>
             <a:r>
-              <a:rPr lang="en-US" sz="2400" b="1" dirty="0" err="1">
+              <a:rPr lang="en-US" sz="2400" b="1" dirty="0">
                 <a:solidFill>
                   <a:sysClr val="window" lastClr="FFFFFF"/>
                 </a:solidFill>
               </a:rPr>
-              <a:t>AirBnB</a:t>
-            </a:r>
-            <a:r>
-              <a:rPr lang="en-US" sz="2400" b="1" dirty="0">
-                <a:solidFill>
-                  <a:sysClr val="window" lastClr="FFFFFF"/>
-                </a:solidFill>
-              </a:rPr>
-              <a:t> Toronto Data Analysis</a:t>
+              <a:t>Airbnb Toronto Data Analysis</a:t>
             </a:r>
             <a:br>
               <a:rPr kumimoji="0" lang="en-US" sz="2400" b="0" i="0" u="none" strike="noStrike" kern="1200" cap="none" spc="0" normalizeH="0" baseline="0" noProof="0" dirty="0">
@@ -9641,12 +11181,8 @@
           <a:lstStyle/>
           <a:p>
             <a:r>
-              <a:rPr lang="en-US" dirty="0" err="1"/>
-              <a:t>AirBnB</a:t>
-            </a:r>
-            <a:r>
               <a:rPr lang="en-US" dirty="0"/>
-              <a:t> Toronto Data Analysis</a:t>
+              <a:t>Airbnb Toronto Data Analysis</a:t>
             </a:r>
           </a:p>
         </p:txBody>
@@ -9905,20 +11441,12 @@
           <a:p>
             <a:pPr lvl="0" defTabSz="914400"/>
             <a:r>
-              <a:rPr lang="en-US" sz="2400" b="1" dirty="0" err="1">
+              <a:rPr lang="en-US" sz="2400" b="1" dirty="0">
                 <a:solidFill>
                   <a:sysClr val="window" lastClr="FFFFFF"/>
                 </a:solidFill>
               </a:rPr>
-              <a:t>AirBnB</a:t>
-            </a:r>
-            <a:r>
-              <a:rPr lang="en-US" sz="2400" b="1" dirty="0">
-                <a:solidFill>
-                  <a:sysClr val="window" lastClr="FFFFFF"/>
-                </a:solidFill>
-              </a:rPr>
-              <a:t> Toronto Data Analysis</a:t>
+              <a:t>Airbnb Toronto Data Analysis</a:t>
             </a:r>
             <a:br>
               <a:rPr kumimoji="0" lang="en-US" sz="2400" b="0" i="0" u="none" strike="noStrike" kern="1200" cap="none" spc="0" normalizeH="0" baseline="0" noProof="0" dirty="0">

</xml_diff>